<commit_message>
add more detailed plots
</commit_message>
<xml_diff>
--- a/cvrptw/CVRP-TW.pptx
+++ b/cvrptw/CVRP-TW.pptx
@@ -11,6 +11,18 @@
     <p:sldId id="260" r:id="rId5"/>
     <p:sldId id="261" r:id="rId6"/>
     <p:sldId id="262" r:id="rId7"/>
+    <p:sldId id="264" r:id="rId8"/>
+    <p:sldId id="271" r:id="rId9"/>
+    <p:sldId id="265" r:id="rId10"/>
+    <p:sldId id="272" r:id="rId11"/>
+    <p:sldId id="266" r:id="rId12"/>
+    <p:sldId id="273" r:id="rId13"/>
+    <p:sldId id="267" r:id="rId14"/>
+    <p:sldId id="274" r:id="rId15"/>
+    <p:sldId id="268" r:id="rId16"/>
+    <p:sldId id="275" r:id="rId17"/>
+    <p:sldId id="269" r:id="rId18"/>
+    <p:sldId id="270" r:id="rId19"/>
   </p:sldIdLst>
   <p:sldSz cx="12192000" cy="6858000"/>
   <p:notesSz cx="6858000" cy="9144000"/>
@@ -264,7 +276,7 @@
           <a:p>
             <a:fld id="{5509EB16-9B05-4C73-9EC2-D5C69DC6B901}" type="datetimeFigureOut">
               <a:rPr lang="it-IT" smtClean="0"/>
-              <a:t>04/04/2025</a:t>
+              <a:t>06/04/2025</a:t>
             </a:fld>
             <a:endParaRPr lang="it-IT"/>
           </a:p>
@@ -462,7 +474,7 @@
           <a:p>
             <a:fld id="{5509EB16-9B05-4C73-9EC2-D5C69DC6B901}" type="datetimeFigureOut">
               <a:rPr lang="it-IT" smtClean="0"/>
-              <a:t>04/04/2025</a:t>
+              <a:t>06/04/2025</a:t>
             </a:fld>
             <a:endParaRPr lang="it-IT"/>
           </a:p>
@@ -670,7 +682,7 @@
           <a:p>
             <a:fld id="{5509EB16-9B05-4C73-9EC2-D5C69DC6B901}" type="datetimeFigureOut">
               <a:rPr lang="it-IT" smtClean="0"/>
-              <a:t>04/04/2025</a:t>
+              <a:t>06/04/2025</a:t>
             </a:fld>
             <a:endParaRPr lang="it-IT"/>
           </a:p>
@@ -868,7 +880,7 @@
           <a:p>
             <a:fld id="{5509EB16-9B05-4C73-9EC2-D5C69DC6B901}" type="datetimeFigureOut">
               <a:rPr lang="it-IT" smtClean="0"/>
-              <a:t>04/04/2025</a:t>
+              <a:t>06/04/2025</a:t>
             </a:fld>
             <a:endParaRPr lang="it-IT"/>
           </a:p>
@@ -1143,7 +1155,7 @@
           <a:p>
             <a:fld id="{5509EB16-9B05-4C73-9EC2-D5C69DC6B901}" type="datetimeFigureOut">
               <a:rPr lang="it-IT" smtClean="0"/>
-              <a:t>04/04/2025</a:t>
+              <a:t>06/04/2025</a:t>
             </a:fld>
             <a:endParaRPr lang="it-IT"/>
           </a:p>
@@ -1408,7 +1420,7 @@
           <a:p>
             <a:fld id="{5509EB16-9B05-4C73-9EC2-D5C69DC6B901}" type="datetimeFigureOut">
               <a:rPr lang="it-IT" smtClean="0"/>
-              <a:t>04/04/2025</a:t>
+              <a:t>06/04/2025</a:t>
             </a:fld>
             <a:endParaRPr lang="it-IT"/>
           </a:p>
@@ -1820,7 +1832,7 @@
           <a:p>
             <a:fld id="{5509EB16-9B05-4C73-9EC2-D5C69DC6B901}" type="datetimeFigureOut">
               <a:rPr lang="it-IT" smtClean="0"/>
-              <a:t>04/04/2025</a:t>
+              <a:t>06/04/2025</a:t>
             </a:fld>
             <a:endParaRPr lang="it-IT"/>
           </a:p>
@@ -1961,7 +1973,7 @@
           <a:p>
             <a:fld id="{5509EB16-9B05-4C73-9EC2-D5C69DC6B901}" type="datetimeFigureOut">
               <a:rPr lang="it-IT" smtClean="0"/>
-              <a:t>04/04/2025</a:t>
+              <a:t>06/04/2025</a:t>
             </a:fld>
             <a:endParaRPr lang="it-IT"/>
           </a:p>
@@ -2074,7 +2086,7 @@
           <a:p>
             <a:fld id="{5509EB16-9B05-4C73-9EC2-D5C69DC6B901}" type="datetimeFigureOut">
               <a:rPr lang="it-IT" smtClean="0"/>
-              <a:t>04/04/2025</a:t>
+              <a:t>06/04/2025</a:t>
             </a:fld>
             <a:endParaRPr lang="it-IT"/>
           </a:p>
@@ -2385,7 +2397,7 @@
           <a:p>
             <a:fld id="{5509EB16-9B05-4C73-9EC2-D5C69DC6B901}" type="datetimeFigureOut">
               <a:rPr lang="it-IT" smtClean="0"/>
-              <a:t>04/04/2025</a:t>
+              <a:t>06/04/2025</a:t>
             </a:fld>
             <a:endParaRPr lang="it-IT"/>
           </a:p>
@@ -2673,7 +2685,7 @@
           <a:p>
             <a:fld id="{5509EB16-9B05-4C73-9EC2-D5C69DC6B901}" type="datetimeFigureOut">
               <a:rPr lang="it-IT" smtClean="0"/>
-              <a:t>04/04/2025</a:t>
+              <a:t>06/04/2025</a:t>
             </a:fld>
             <a:endParaRPr lang="it-IT"/>
           </a:p>
@@ -2914,7 +2926,7 @@
           <a:p>
             <a:fld id="{5509EB16-9B05-4C73-9EC2-D5C69DC6B901}" type="datetimeFigureOut">
               <a:rPr lang="it-IT" smtClean="0"/>
-              <a:t>04/04/2025</a:t>
+              <a:t>06/04/2025</a:t>
             </a:fld>
             <a:endParaRPr lang="it-IT"/>
           </a:p>
@@ -3651,6 +3663,2200 @@
     <p:extLst>
       <p:ext uri="{BB962C8B-B14F-4D97-AF65-F5344CB8AC3E}">
         <p14:creationId xmlns:p14="http://schemas.microsoft.com/office/powerpoint/2010/main" val="3829933398"/>
+      </p:ext>
+    </p:extLst>
+  </p:cSld>
+  <p:clrMapOvr>
+    <a:masterClrMapping/>
+  </p:clrMapOvr>
+</p:sld>
+</file>
+
+<file path=ppt/slides/slide10.xml><?xml version="1.0" encoding="utf-8"?>
+<p:sld xmlns:a="http://schemas.openxmlformats.org/drawingml/2006/main" xmlns:r="http://schemas.openxmlformats.org/officeDocument/2006/relationships" xmlns:p="http://schemas.openxmlformats.org/presentationml/2006/main">
+  <p:cSld>
+    <p:spTree>
+      <p:nvGrpSpPr>
+        <p:cNvPr id="1" name="">
+          <a:extLst>
+            <a:ext uri="{FF2B5EF4-FFF2-40B4-BE49-F238E27FC236}">
+              <a16:creationId xmlns:a16="http://schemas.microsoft.com/office/drawing/2014/main" id="{6E40939E-8E34-7E61-3E34-F911180AC1AB}"/>
+            </a:ext>
+          </a:extLst>
+        </p:cNvPr>
+        <p:cNvGrpSpPr/>
+        <p:nvPr/>
+      </p:nvGrpSpPr>
+      <p:grpSpPr>
+        <a:xfrm>
+          <a:off x="0" y="0"/>
+          <a:ext cx="0" cy="0"/>
+          <a:chOff x="0" y="0"/>
+          <a:chExt cx="0" cy="0"/>
+        </a:xfrm>
+      </p:grpSpPr>
+      <p:sp>
+        <p:nvSpPr>
+          <p:cNvPr id="2" name="Titolo 1">
+            <a:extLst>
+              <a:ext uri="{FF2B5EF4-FFF2-40B4-BE49-F238E27FC236}">
+                <a16:creationId xmlns:a16="http://schemas.microsoft.com/office/drawing/2014/main" id="{3A66B391-FB23-F67C-16A7-2DAE0D3CA53F}"/>
+              </a:ext>
+            </a:extLst>
+          </p:cNvPr>
+          <p:cNvSpPr>
+            <a:spLocks noGrp="1"/>
+          </p:cNvSpPr>
+          <p:nvPr>
+            <p:ph type="title"/>
+          </p:nvPr>
+        </p:nvSpPr>
+        <p:spPr>
+          <a:xfrm>
+            <a:off x="838200" y="365126"/>
+            <a:ext cx="10515600" cy="734332"/>
+          </a:xfrm>
+        </p:spPr>
+        <p:txBody>
+          <a:bodyPr/>
+          <a:lstStyle/>
+          <a:p>
+            <a:pPr algn="ctr"/>
+            <a:r>
+              <a:rPr lang="it-IT" dirty="0" err="1"/>
+              <a:t>Results</a:t>
+            </a:r>
+            <a:r>
+              <a:rPr lang="it-IT" dirty="0"/>
+              <a:t> on the 2-Group </a:t>
+            </a:r>
+            <a:r>
+              <a:rPr lang="it-IT" dirty="0" err="1"/>
+              <a:t>instances</a:t>
+            </a:r>
+            <a:endParaRPr lang="it-IT" dirty="0"/>
+          </a:p>
+        </p:txBody>
+      </p:sp>
+      <p:sp>
+        <p:nvSpPr>
+          <p:cNvPr id="4" name="Segnaposto contenuto 3">
+            <a:extLst>
+              <a:ext uri="{FF2B5EF4-FFF2-40B4-BE49-F238E27FC236}">
+                <a16:creationId xmlns:a16="http://schemas.microsoft.com/office/drawing/2014/main" id="{B5E3A57F-A593-9FB7-F0F1-1A4B4FA73A32}"/>
+              </a:ext>
+            </a:extLst>
+          </p:cNvPr>
+          <p:cNvSpPr>
+            <a:spLocks noGrp="1"/>
+          </p:cNvSpPr>
+          <p:nvPr>
+            <p:ph sz="half" idx="2"/>
+          </p:nvPr>
+        </p:nvSpPr>
+        <p:spPr>
+          <a:xfrm>
+            <a:off x="751114" y="1447800"/>
+            <a:ext cx="10515600" cy="4729163"/>
+          </a:xfrm>
+        </p:spPr>
+        <p:txBody>
+          <a:bodyPr/>
+          <a:lstStyle/>
+          <a:p>
+            <a:r>
+              <a:rPr lang="it-IT" dirty="0"/>
+              <a:t>The CP model </a:t>
+            </a:r>
+            <a:r>
+              <a:rPr lang="it-IT" dirty="0" err="1"/>
+              <a:t>outperforms</a:t>
+            </a:r>
+            <a:r>
+              <a:rPr lang="it-IT" dirty="0"/>
+              <a:t> the DIDP models.</a:t>
+            </a:r>
+          </a:p>
+          <a:p>
+            <a:r>
+              <a:rPr lang="it-IT" dirty="0"/>
+              <a:t>In 2-Group, the </a:t>
+            </a:r>
+            <a:r>
+              <a:rPr lang="it-IT" dirty="0" err="1"/>
+              <a:t>instances</a:t>
+            </a:r>
+            <a:r>
+              <a:rPr lang="it-IT" dirty="0"/>
+              <a:t> are </a:t>
+            </a:r>
+            <a:r>
+              <a:rPr lang="it-IT" dirty="0" err="1"/>
+              <a:t>less</a:t>
+            </a:r>
+            <a:r>
+              <a:rPr lang="it-IT" dirty="0"/>
+              <a:t> </a:t>
+            </a:r>
+            <a:r>
+              <a:rPr lang="it-IT" dirty="0" err="1"/>
+              <a:t>constrained</a:t>
+            </a:r>
+            <a:r>
+              <a:rPr lang="it-IT" dirty="0"/>
+              <a:t>.</a:t>
+            </a:r>
+          </a:p>
+          <a:p>
+            <a:r>
+              <a:rPr lang="it-IT" dirty="0"/>
+              <a:t>The dual bounds </a:t>
+            </a:r>
+            <a:r>
+              <a:rPr lang="it-IT" dirty="0" err="1"/>
+              <a:t>seem</a:t>
+            </a:r>
+            <a:r>
+              <a:rPr lang="it-IT" dirty="0"/>
+              <a:t> to </a:t>
+            </a:r>
+            <a:r>
+              <a:rPr lang="it-IT" dirty="0" err="1"/>
+              <a:t>struggle</a:t>
+            </a:r>
+            <a:r>
+              <a:rPr lang="it-IT" dirty="0"/>
+              <a:t> more in the </a:t>
+            </a:r>
+            <a:r>
+              <a:rPr lang="it-IT" dirty="0" err="1"/>
+              <a:t>search</a:t>
+            </a:r>
+            <a:r>
+              <a:rPr lang="it-IT" dirty="0"/>
+              <a:t> </a:t>
+            </a:r>
+            <a:r>
+              <a:rPr lang="it-IT" dirty="0" err="1"/>
+              <a:t>guidance</a:t>
+            </a:r>
+            <a:r>
+              <a:rPr lang="it-IT" dirty="0"/>
+              <a:t> </a:t>
+            </a:r>
+            <a:r>
+              <a:rPr lang="it-IT" dirty="0" err="1"/>
+              <a:t>process</a:t>
+            </a:r>
+            <a:r>
+              <a:rPr lang="it-IT" dirty="0"/>
+              <a:t>, making the </a:t>
+            </a:r>
+            <a:r>
+              <a:rPr lang="it-IT" dirty="0" err="1"/>
+              <a:t>two</a:t>
+            </a:r>
+            <a:r>
+              <a:rPr lang="it-IT" dirty="0"/>
+              <a:t> DIDP models </a:t>
+            </a:r>
+            <a:r>
+              <a:rPr lang="it-IT" dirty="0" err="1"/>
+              <a:t>without</a:t>
+            </a:r>
+            <a:r>
+              <a:rPr lang="it-IT" dirty="0"/>
+              <a:t> dual bounds </a:t>
+            </a:r>
+            <a:r>
+              <a:rPr lang="it-IT" dirty="0" err="1"/>
+              <a:t>perform</a:t>
+            </a:r>
+            <a:r>
+              <a:rPr lang="it-IT" dirty="0"/>
+              <a:t> </a:t>
+            </a:r>
+            <a:r>
+              <a:rPr lang="it-IT" dirty="0" err="1"/>
+              <a:t>better</a:t>
+            </a:r>
+            <a:r>
+              <a:rPr lang="it-IT" dirty="0"/>
+              <a:t>.</a:t>
+            </a:r>
+          </a:p>
+          <a:p>
+            <a:r>
+              <a:rPr lang="it-IT" dirty="0"/>
+              <a:t>The </a:t>
+            </a:r>
+            <a:r>
+              <a:rPr lang="it-IT" dirty="0" err="1"/>
+              <a:t>highest</a:t>
+            </a:r>
+            <a:r>
+              <a:rPr lang="it-IT" dirty="0"/>
+              <a:t> performance gap </a:t>
+            </a:r>
+            <a:r>
+              <a:rPr lang="it-IT" dirty="0" err="1"/>
+              <a:t>remains</a:t>
+            </a:r>
+            <a:r>
+              <a:rPr lang="it-IT" dirty="0"/>
+              <a:t> the one </a:t>
+            </a:r>
+            <a:r>
+              <a:rPr lang="it-IT" dirty="0" err="1"/>
+              <a:t>between</a:t>
+            </a:r>
+            <a:r>
+              <a:rPr lang="it-IT" dirty="0"/>
+              <a:t> CP and DIDP.</a:t>
+            </a:r>
+          </a:p>
+        </p:txBody>
+      </p:sp>
+    </p:spTree>
+    <p:extLst>
+      <p:ext uri="{BB962C8B-B14F-4D97-AF65-F5344CB8AC3E}">
+        <p14:creationId xmlns:p14="http://schemas.microsoft.com/office/powerpoint/2010/main" val="3879830225"/>
+      </p:ext>
+    </p:extLst>
+  </p:cSld>
+  <p:clrMapOvr>
+    <a:masterClrMapping/>
+  </p:clrMapOvr>
+</p:sld>
+</file>
+
+<file path=ppt/slides/slide11.xml><?xml version="1.0" encoding="utf-8"?>
+<p:sld xmlns:a="http://schemas.openxmlformats.org/drawingml/2006/main" xmlns:r="http://schemas.openxmlformats.org/officeDocument/2006/relationships" xmlns:p="http://schemas.openxmlformats.org/presentationml/2006/main">
+  <p:cSld>
+    <p:spTree>
+      <p:nvGrpSpPr>
+        <p:cNvPr id="1" name="">
+          <a:extLst>
+            <a:ext uri="{FF2B5EF4-FFF2-40B4-BE49-F238E27FC236}">
+              <a16:creationId xmlns:a16="http://schemas.microsoft.com/office/drawing/2014/main" id="{95F751D0-38D9-E8CF-3935-7F8097B12FBE}"/>
+            </a:ext>
+          </a:extLst>
+        </p:cNvPr>
+        <p:cNvGrpSpPr/>
+        <p:nvPr/>
+      </p:nvGrpSpPr>
+      <p:grpSpPr>
+        <a:xfrm>
+          <a:off x="0" y="0"/>
+          <a:ext cx="0" cy="0"/>
+          <a:chOff x="0" y="0"/>
+          <a:chExt cx="0" cy="0"/>
+        </a:xfrm>
+      </p:grpSpPr>
+      <p:sp>
+        <p:nvSpPr>
+          <p:cNvPr id="2" name="Titolo 1">
+            <a:extLst>
+              <a:ext uri="{FF2B5EF4-FFF2-40B4-BE49-F238E27FC236}">
+                <a16:creationId xmlns:a16="http://schemas.microsoft.com/office/drawing/2014/main" id="{05A07B13-3905-15B9-BB5F-58372086D2BC}"/>
+              </a:ext>
+            </a:extLst>
+          </p:cNvPr>
+          <p:cNvSpPr>
+            <a:spLocks noGrp="1"/>
+          </p:cNvSpPr>
+          <p:nvPr>
+            <p:ph type="title"/>
+          </p:nvPr>
+        </p:nvSpPr>
+        <p:spPr>
+          <a:xfrm>
+            <a:off x="838200" y="365126"/>
+            <a:ext cx="10515600" cy="734332"/>
+          </a:xfrm>
+        </p:spPr>
+        <p:txBody>
+          <a:bodyPr/>
+          <a:lstStyle/>
+          <a:p>
+            <a:pPr algn="ctr"/>
+            <a:r>
+              <a:rPr lang="it-IT" dirty="0" err="1"/>
+              <a:t>Results</a:t>
+            </a:r>
+            <a:r>
+              <a:rPr lang="it-IT" dirty="0"/>
+              <a:t> on the C-Group </a:t>
+            </a:r>
+            <a:r>
+              <a:rPr lang="it-IT" dirty="0" err="1"/>
+              <a:t>instances</a:t>
+            </a:r>
+            <a:endParaRPr lang="it-IT" dirty="0"/>
+          </a:p>
+        </p:txBody>
+      </p:sp>
+      <p:pic>
+        <p:nvPicPr>
+          <p:cNvPr id="7" name="Segnaposto contenuto 6" descr="Immagine che contiene testo, linea, Diagramma, diagramma&#10;&#10;Il contenuto generato dall'IA potrebbe non essere corretto.">
+            <a:extLst>
+              <a:ext uri="{FF2B5EF4-FFF2-40B4-BE49-F238E27FC236}">
+                <a16:creationId xmlns:a16="http://schemas.microsoft.com/office/drawing/2014/main" id="{28C6B4A9-AC43-1985-E07F-13B4753BC61B}"/>
+              </a:ext>
+            </a:extLst>
+          </p:cNvPr>
+          <p:cNvPicPr>
+            <a:picLocks noGrp="1" noChangeAspect="1"/>
+          </p:cNvPicPr>
+          <p:nvPr>
+            <p:ph sz="half" idx="2"/>
+          </p:nvPr>
+        </p:nvPicPr>
+        <p:blipFill>
+          <a:blip r:embed="rId2">
+            <a:extLst>
+              <a:ext uri="{28A0092B-C50C-407E-A947-70E740481C1C}">
+                <a14:useLocalDpi xmlns:a14="http://schemas.microsoft.com/office/drawing/2010/main" val="0"/>
+              </a:ext>
+            </a:extLst>
+          </a:blip>
+          <a:stretch>
+            <a:fillRect/>
+          </a:stretch>
+        </p:blipFill>
+        <p:spPr>
+          <a:xfrm>
+            <a:off x="1790700" y="1111249"/>
+            <a:ext cx="8610599" cy="5381625"/>
+          </a:xfrm>
+        </p:spPr>
+      </p:pic>
+    </p:spTree>
+    <p:extLst>
+      <p:ext uri="{BB962C8B-B14F-4D97-AF65-F5344CB8AC3E}">
+        <p14:creationId xmlns:p14="http://schemas.microsoft.com/office/powerpoint/2010/main" val="3989724299"/>
+      </p:ext>
+    </p:extLst>
+  </p:cSld>
+  <p:clrMapOvr>
+    <a:masterClrMapping/>
+  </p:clrMapOvr>
+</p:sld>
+</file>
+
+<file path=ppt/slides/slide12.xml><?xml version="1.0" encoding="utf-8"?>
+<p:sld xmlns:a="http://schemas.openxmlformats.org/drawingml/2006/main" xmlns:r="http://schemas.openxmlformats.org/officeDocument/2006/relationships" xmlns:p="http://schemas.openxmlformats.org/presentationml/2006/main">
+  <p:cSld>
+    <p:spTree>
+      <p:nvGrpSpPr>
+        <p:cNvPr id="1" name="">
+          <a:extLst>
+            <a:ext uri="{FF2B5EF4-FFF2-40B4-BE49-F238E27FC236}">
+              <a16:creationId xmlns:a16="http://schemas.microsoft.com/office/drawing/2014/main" id="{1505090D-A38B-41BA-079C-49E9603E990D}"/>
+            </a:ext>
+          </a:extLst>
+        </p:cNvPr>
+        <p:cNvGrpSpPr/>
+        <p:nvPr/>
+      </p:nvGrpSpPr>
+      <p:grpSpPr>
+        <a:xfrm>
+          <a:off x="0" y="0"/>
+          <a:ext cx="0" cy="0"/>
+          <a:chOff x="0" y="0"/>
+          <a:chExt cx="0" cy="0"/>
+        </a:xfrm>
+      </p:grpSpPr>
+      <p:sp>
+        <p:nvSpPr>
+          <p:cNvPr id="2" name="Titolo 1">
+            <a:extLst>
+              <a:ext uri="{FF2B5EF4-FFF2-40B4-BE49-F238E27FC236}">
+                <a16:creationId xmlns:a16="http://schemas.microsoft.com/office/drawing/2014/main" id="{ED92AC9A-1142-F454-4716-A13FD7A78518}"/>
+              </a:ext>
+            </a:extLst>
+          </p:cNvPr>
+          <p:cNvSpPr>
+            <a:spLocks noGrp="1"/>
+          </p:cNvSpPr>
+          <p:nvPr>
+            <p:ph type="title"/>
+          </p:nvPr>
+        </p:nvSpPr>
+        <p:spPr>
+          <a:xfrm>
+            <a:off x="838200" y="365126"/>
+            <a:ext cx="10515600" cy="734332"/>
+          </a:xfrm>
+        </p:spPr>
+        <p:txBody>
+          <a:bodyPr/>
+          <a:lstStyle/>
+          <a:p>
+            <a:pPr algn="ctr"/>
+            <a:r>
+              <a:rPr lang="it-IT" dirty="0" err="1"/>
+              <a:t>Results</a:t>
+            </a:r>
+            <a:r>
+              <a:rPr lang="it-IT" dirty="0"/>
+              <a:t> on the C-Group </a:t>
+            </a:r>
+            <a:r>
+              <a:rPr lang="it-IT" dirty="0" err="1"/>
+              <a:t>instances</a:t>
+            </a:r>
+            <a:endParaRPr lang="it-IT" dirty="0"/>
+          </a:p>
+        </p:txBody>
+      </p:sp>
+      <p:sp>
+        <p:nvSpPr>
+          <p:cNvPr id="4" name="Segnaposto contenuto 3">
+            <a:extLst>
+              <a:ext uri="{FF2B5EF4-FFF2-40B4-BE49-F238E27FC236}">
+                <a16:creationId xmlns:a16="http://schemas.microsoft.com/office/drawing/2014/main" id="{D0916EC2-6DEB-F6D7-B42C-CCFC137A61BF}"/>
+              </a:ext>
+            </a:extLst>
+          </p:cNvPr>
+          <p:cNvSpPr>
+            <a:spLocks noGrp="1"/>
+          </p:cNvSpPr>
+          <p:nvPr>
+            <p:ph sz="half" idx="2"/>
+          </p:nvPr>
+        </p:nvSpPr>
+        <p:spPr>
+          <a:xfrm>
+            <a:off x="751114" y="1447800"/>
+            <a:ext cx="10515600" cy="4729163"/>
+          </a:xfrm>
+        </p:spPr>
+        <p:txBody>
+          <a:bodyPr>
+            <a:normAutofit fontScale="92500" lnSpcReduction="10000"/>
+          </a:bodyPr>
+          <a:lstStyle/>
+          <a:p>
+            <a:pPr marL="0" indent="0">
+              <a:buNone/>
+            </a:pPr>
+            <a:r>
+              <a:rPr lang="it-IT" dirty="0"/>
+              <a:t>The C-group shows a </a:t>
+            </a:r>
+            <a:r>
+              <a:rPr lang="it-IT" dirty="0" err="1"/>
+              <a:t>stranger</a:t>
+            </a:r>
+            <a:r>
+              <a:rPr lang="it-IT" dirty="0"/>
+              <a:t> </a:t>
+            </a:r>
+            <a:r>
+              <a:rPr lang="it-IT" dirty="0" err="1"/>
+              <a:t>behaviour</a:t>
+            </a:r>
+            <a:r>
+              <a:rPr lang="it-IT" dirty="0"/>
+              <a:t>, with DIDP complete </a:t>
+            </a:r>
+            <a:r>
+              <a:rPr lang="it-IT" dirty="0" err="1"/>
+              <a:t>even</a:t>
+            </a:r>
+            <a:r>
+              <a:rPr lang="it-IT" dirty="0"/>
+              <a:t> </a:t>
+            </a:r>
+            <a:r>
+              <a:rPr lang="it-IT" dirty="0" err="1"/>
+              <a:t>slightly</a:t>
+            </a:r>
+            <a:r>
+              <a:rPr lang="it-IT" dirty="0"/>
+              <a:t> </a:t>
+            </a:r>
+            <a:r>
+              <a:rPr lang="it-IT" dirty="0" err="1"/>
+              <a:t>outperforming</a:t>
+            </a:r>
+            <a:r>
+              <a:rPr lang="it-IT" dirty="0"/>
+              <a:t> CP </a:t>
+            </a:r>
+            <a:r>
+              <a:rPr lang="it-IT" dirty="0" err="1"/>
+              <a:t>at</a:t>
+            </a:r>
+            <a:r>
+              <a:rPr lang="it-IT" dirty="0"/>
+              <a:t> the </a:t>
+            </a:r>
+            <a:r>
+              <a:rPr lang="it-IT" dirty="0" err="1"/>
+              <a:t>beginning</a:t>
+            </a:r>
+            <a:r>
+              <a:rPr lang="it-IT" dirty="0"/>
+              <a:t>, </a:t>
+            </a:r>
+            <a:r>
+              <a:rPr lang="it-IT" dirty="0" err="1"/>
+              <a:t>before</a:t>
+            </a:r>
+            <a:r>
+              <a:rPr lang="it-IT" dirty="0"/>
+              <a:t> </a:t>
+            </a:r>
+            <a:r>
+              <a:rPr lang="it-IT" dirty="0" err="1"/>
+              <a:t>becaming</a:t>
+            </a:r>
+            <a:r>
+              <a:rPr lang="it-IT" dirty="0"/>
+              <a:t> the </a:t>
+            </a:r>
+            <a:r>
+              <a:rPr lang="it-IT" dirty="0" err="1"/>
+              <a:t>worst</a:t>
+            </a:r>
+            <a:r>
+              <a:rPr lang="it-IT" dirty="0"/>
+              <a:t> </a:t>
+            </a:r>
+            <a:r>
+              <a:rPr lang="it-IT" dirty="0" err="1"/>
+              <a:t>among</a:t>
+            </a:r>
+            <a:r>
+              <a:rPr lang="it-IT" dirty="0"/>
+              <a:t> </a:t>
+            </a:r>
+            <a:r>
+              <a:rPr lang="it-IT" dirty="0" err="1"/>
+              <a:t>all</a:t>
+            </a:r>
+            <a:r>
+              <a:rPr lang="it-IT" dirty="0"/>
+              <a:t> models.</a:t>
+            </a:r>
+          </a:p>
+          <a:p>
+            <a:pPr marL="0" indent="0">
+              <a:buNone/>
+            </a:pPr>
+            <a:r>
+              <a:rPr lang="it-IT" dirty="0"/>
+              <a:t>C </a:t>
+            </a:r>
+            <a:r>
+              <a:rPr lang="it-IT" dirty="0" err="1"/>
+              <a:t>instances</a:t>
+            </a:r>
+            <a:r>
+              <a:rPr lang="it-IT" dirty="0"/>
+              <a:t> </a:t>
+            </a:r>
+            <a:r>
+              <a:rPr lang="it-IT" dirty="0" err="1"/>
+              <a:t>have</a:t>
+            </a:r>
+            <a:r>
+              <a:rPr lang="it-IT" dirty="0"/>
+              <a:t> </a:t>
+            </a:r>
+            <a:r>
+              <a:rPr lang="it-IT" dirty="0" err="1"/>
+              <a:t>clustered</a:t>
+            </a:r>
+            <a:r>
+              <a:rPr lang="it-IT" dirty="0"/>
+              <a:t> locations: dual bounds are </a:t>
+            </a:r>
+            <a:r>
+              <a:rPr lang="it-IT" dirty="0" err="1"/>
+              <a:t>unable</a:t>
+            </a:r>
+            <a:r>
+              <a:rPr lang="it-IT" dirty="0"/>
+              <a:t> to </a:t>
+            </a:r>
+            <a:r>
+              <a:rPr lang="it-IT" dirty="0" err="1"/>
+              <a:t>capture</a:t>
+            </a:r>
+            <a:r>
+              <a:rPr lang="it-IT" dirty="0"/>
+              <a:t> the high </a:t>
+            </a:r>
+            <a:r>
+              <a:rPr lang="it-IT" dirty="0" err="1"/>
+              <a:t>discrepancy</a:t>
+            </a:r>
+            <a:r>
+              <a:rPr lang="it-IT" dirty="0"/>
+              <a:t> </a:t>
+            </a:r>
+            <a:r>
+              <a:rPr lang="it-IT" dirty="0" err="1"/>
+              <a:t>between</a:t>
+            </a:r>
+            <a:r>
+              <a:rPr lang="it-IT" dirty="0"/>
+              <a:t> the </a:t>
+            </a:r>
+            <a:r>
+              <a:rPr lang="it-IT" dirty="0" err="1"/>
+              <a:t>minimim</a:t>
+            </a:r>
+            <a:r>
+              <a:rPr lang="it-IT" dirty="0"/>
+              <a:t> </a:t>
+            </a:r>
+            <a:r>
+              <a:rPr lang="it-IT" dirty="0" err="1"/>
+              <a:t>distance</a:t>
+            </a:r>
+            <a:r>
+              <a:rPr lang="it-IT" dirty="0"/>
+              <a:t> from and to a location (</a:t>
+            </a:r>
+            <a:r>
+              <a:rPr lang="it-IT" dirty="0" err="1"/>
+              <a:t>distances</a:t>
+            </a:r>
+            <a:r>
+              <a:rPr lang="it-IT" dirty="0"/>
+              <a:t> inside the </a:t>
+            </a:r>
+            <a:r>
+              <a:rPr lang="it-IT" dirty="0" err="1"/>
+              <a:t>same</a:t>
+            </a:r>
+            <a:r>
+              <a:rPr lang="it-IT" dirty="0"/>
+              <a:t> cluster) and the </a:t>
+            </a:r>
+            <a:r>
+              <a:rPr lang="it-IT" dirty="0" err="1"/>
+              <a:t>actual</a:t>
+            </a:r>
+            <a:r>
+              <a:rPr lang="it-IT" dirty="0"/>
+              <a:t> cost of a </a:t>
+            </a:r>
+            <a:r>
+              <a:rPr lang="it-IT" dirty="0" err="1"/>
+              <a:t>transition</a:t>
+            </a:r>
+            <a:r>
+              <a:rPr lang="it-IT" dirty="0"/>
+              <a:t> </a:t>
+            </a:r>
+            <a:r>
+              <a:rPr lang="it-IT" dirty="0" err="1"/>
+              <a:t>if</a:t>
+            </a:r>
+            <a:r>
+              <a:rPr lang="it-IT" dirty="0"/>
+              <a:t> </a:t>
+            </a:r>
+            <a:r>
+              <a:rPr lang="it-IT" dirty="0" err="1"/>
+              <a:t>we</a:t>
+            </a:r>
+            <a:r>
+              <a:rPr lang="it-IT" dirty="0"/>
+              <a:t> </a:t>
+            </a:r>
+            <a:r>
+              <a:rPr lang="it-IT" dirty="0" err="1"/>
+              <a:t>have</a:t>
+            </a:r>
+            <a:r>
+              <a:rPr lang="it-IT" dirty="0"/>
+              <a:t> to </a:t>
+            </a:r>
+            <a:r>
+              <a:rPr lang="it-IT" dirty="0" err="1"/>
+              <a:t>reach</a:t>
+            </a:r>
+            <a:r>
+              <a:rPr lang="it-IT" dirty="0"/>
+              <a:t> a location from </a:t>
+            </a:r>
+            <a:r>
+              <a:rPr lang="it-IT" dirty="0" err="1"/>
+              <a:t>outiside</a:t>
+            </a:r>
+            <a:r>
+              <a:rPr lang="it-IT" dirty="0"/>
+              <a:t> </a:t>
+            </a:r>
+            <a:r>
+              <a:rPr lang="it-IT" dirty="0" err="1"/>
+              <a:t>its</a:t>
+            </a:r>
+            <a:r>
+              <a:rPr lang="it-IT" dirty="0"/>
+              <a:t> cluster:</a:t>
+            </a:r>
+          </a:p>
+          <a:p>
+            <a:r>
+              <a:rPr lang="it-IT" dirty="0"/>
+              <a:t>In C1, the </a:t>
+            </a:r>
+            <a:r>
+              <a:rPr lang="it-IT" dirty="0" err="1"/>
+              <a:t>natural</a:t>
+            </a:r>
+            <a:r>
+              <a:rPr lang="it-IT" dirty="0"/>
+              <a:t> </a:t>
+            </a:r>
+            <a:r>
+              <a:rPr lang="it-IT" dirty="0" err="1"/>
+              <a:t>solution</a:t>
+            </a:r>
+            <a:r>
+              <a:rPr lang="it-IT" dirty="0"/>
+              <a:t> of </a:t>
+            </a:r>
+            <a:r>
+              <a:rPr lang="it-IT" dirty="0" err="1"/>
+              <a:t>trying</a:t>
+            </a:r>
+            <a:r>
+              <a:rPr lang="it-IT" dirty="0"/>
+              <a:t> to </a:t>
+            </a:r>
+            <a:r>
+              <a:rPr lang="it-IT" dirty="0" err="1"/>
+              <a:t>assign</a:t>
+            </a:r>
+            <a:r>
+              <a:rPr lang="it-IT" dirty="0"/>
+              <a:t> a </a:t>
+            </a:r>
+            <a:r>
+              <a:rPr lang="it-IT" dirty="0" err="1"/>
+              <a:t>vehicle</a:t>
+            </a:r>
+            <a:r>
+              <a:rPr lang="it-IT" dirty="0"/>
+              <a:t> for cluster </a:t>
+            </a:r>
+            <a:r>
+              <a:rPr lang="it-IT" dirty="0" err="1"/>
+              <a:t>is</a:t>
+            </a:r>
+            <a:r>
+              <a:rPr lang="it-IT" dirty="0"/>
+              <a:t> </a:t>
+            </a:r>
+            <a:r>
+              <a:rPr lang="it-IT" dirty="0" err="1"/>
+              <a:t>not</a:t>
+            </a:r>
+            <a:r>
+              <a:rPr lang="it-IT" dirty="0"/>
+              <a:t> </a:t>
+            </a:r>
+            <a:r>
+              <a:rPr lang="it-IT" dirty="0" err="1"/>
+              <a:t>possible</a:t>
+            </a:r>
+            <a:r>
+              <a:rPr lang="it-IT" dirty="0"/>
+              <a:t> due to the </a:t>
+            </a:r>
+            <a:r>
+              <a:rPr lang="it-IT" dirty="0" err="1"/>
+              <a:t>stict</a:t>
+            </a:r>
+            <a:r>
+              <a:rPr lang="it-IT" dirty="0"/>
+              <a:t> </a:t>
+            </a:r>
+            <a:r>
+              <a:rPr lang="it-IT" dirty="0" err="1"/>
+              <a:t>constraints</a:t>
+            </a:r>
+            <a:r>
+              <a:rPr lang="it-IT" dirty="0"/>
+              <a:t>, so the dual bounds are </a:t>
+            </a:r>
+            <a:r>
+              <a:rPr lang="it-IT" dirty="0" err="1"/>
+              <a:t>not</a:t>
+            </a:r>
+            <a:r>
+              <a:rPr lang="it-IT" dirty="0"/>
+              <a:t> </a:t>
+            </a:r>
+            <a:r>
+              <a:rPr lang="it-IT" dirty="0" err="1"/>
+              <a:t>penalizing</a:t>
+            </a:r>
+            <a:r>
+              <a:rPr lang="it-IT" dirty="0"/>
+              <a:t> the </a:t>
+            </a:r>
+            <a:r>
+              <a:rPr lang="it-IT" dirty="0" err="1"/>
+              <a:t>search</a:t>
+            </a:r>
+            <a:r>
+              <a:rPr lang="it-IT" dirty="0"/>
+              <a:t> </a:t>
+            </a:r>
+            <a:r>
+              <a:rPr lang="it-IT" dirty="0" err="1"/>
+              <a:t>process</a:t>
+            </a:r>
+            <a:r>
+              <a:rPr lang="it-IT" dirty="0"/>
+              <a:t>, </a:t>
+            </a:r>
+            <a:r>
+              <a:rPr lang="it-IT" dirty="0" err="1"/>
+              <a:t>leading</a:t>
+            </a:r>
+            <a:r>
+              <a:rPr lang="it-IT" dirty="0"/>
+              <a:t> to </a:t>
+            </a:r>
+            <a:r>
+              <a:rPr lang="it-IT" dirty="0" err="1"/>
+              <a:t>similar</a:t>
+            </a:r>
+            <a:r>
+              <a:rPr lang="it-IT" dirty="0"/>
+              <a:t> performances to </a:t>
+            </a:r>
+            <a:r>
+              <a:rPr lang="it-IT" dirty="0" err="1"/>
+              <a:t>all</a:t>
+            </a:r>
+            <a:r>
+              <a:rPr lang="it-IT" dirty="0"/>
+              <a:t> the models.</a:t>
+            </a:r>
+          </a:p>
+          <a:p>
+            <a:r>
+              <a:rPr lang="it-IT" dirty="0"/>
+              <a:t>In C2, the low </a:t>
+            </a:r>
+            <a:r>
+              <a:rPr lang="it-IT" dirty="0" err="1"/>
+              <a:t>quality</a:t>
+            </a:r>
+            <a:r>
+              <a:rPr lang="it-IT" dirty="0"/>
+              <a:t> of the dual bounds for </a:t>
+            </a:r>
+            <a:r>
+              <a:rPr lang="it-IT" dirty="0" err="1"/>
+              <a:t>search</a:t>
+            </a:r>
+            <a:r>
+              <a:rPr lang="it-IT" dirty="0"/>
+              <a:t> </a:t>
+            </a:r>
+            <a:r>
+              <a:rPr lang="it-IT" dirty="0" err="1"/>
+              <a:t>guidance</a:t>
+            </a:r>
+            <a:r>
+              <a:rPr lang="it-IT" dirty="0"/>
+              <a:t> </a:t>
+            </a:r>
+            <a:r>
+              <a:rPr lang="it-IT" dirty="0" err="1"/>
+              <a:t>emerges</a:t>
+            </a:r>
+            <a:r>
+              <a:rPr lang="it-IT" dirty="0"/>
+              <a:t>, making the models with bounds the </a:t>
+            </a:r>
+            <a:r>
+              <a:rPr lang="it-IT" dirty="0" err="1"/>
+              <a:t>worst</a:t>
+            </a:r>
+            <a:r>
+              <a:rPr lang="it-IT" dirty="0"/>
+              <a:t>.</a:t>
+            </a:r>
+          </a:p>
+        </p:txBody>
+      </p:sp>
+    </p:spTree>
+    <p:extLst>
+      <p:ext uri="{BB962C8B-B14F-4D97-AF65-F5344CB8AC3E}">
+        <p14:creationId xmlns:p14="http://schemas.microsoft.com/office/powerpoint/2010/main" val="842828976"/>
+      </p:ext>
+    </p:extLst>
+  </p:cSld>
+  <p:clrMapOvr>
+    <a:masterClrMapping/>
+  </p:clrMapOvr>
+</p:sld>
+</file>
+
+<file path=ppt/slides/slide13.xml><?xml version="1.0" encoding="utf-8"?>
+<p:sld xmlns:a="http://schemas.openxmlformats.org/drawingml/2006/main" xmlns:r="http://schemas.openxmlformats.org/officeDocument/2006/relationships" xmlns:p="http://schemas.openxmlformats.org/presentationml/2006/main">
+  <p:cSld>
+    <p:spTree>
+      <p:nvGrpSpPr>
+        <p:cNvPr id="1" name="">
+          <a:extLst>
+            <a:ext uri="{FF2B5EF4-FFF2-40B4-BE49-F238E27FC236}">
+              <a16:creationId xmlns:a16="http://schemas.microsoft.com/office/drawing/2014/main" id="{59D6EC4E-2E6F-6251-B8FC-5DFBE63D02C3}"/>
+            </a:ext>
+          </a:extLst>
+        </p:cNvPr>
+        <p:cNvGrpSpPr/>
+        <p:nvPr/>
+      </p:nvGrpSpPr>
+      <p:grpSpPr>
+        <a:xfrm>
+          <a:off x="0" y="0"/>
+          <a:ext cx="0" cy="0"/>
+          <a:chOff x="0" y="0"/>
+          <a:chExt cx="0" cy="0"/>
+        </a:xfrm>
+      </p:grpSpPr>
+      <p:sp>
+        <p:nvSpPr>
+          <p:cNvPr id="2" name="Titolo 1">
+            <a:extLst>
+              <a:ext uri="{FF2B5EF4-FFF2-40B4-BE49-F238E27FC236}">
+                <a16:creationId xmlns:a16="http://schemas.microsoft.com/office/drawing/2014/main" id="{14C96F35-4689-5248-3311-353C54EE4EB9}"/>
+              </a:ext>
+            </a:extLst>
+          </p:cNvPr>
+          <p:cNvSpPr>
+            <a:spLocks noGrp="1"/>
+          </p:cNvSpPr>
+          <p:nvPr>
+            <p:ph type="title"/>
+          </p:nvPr>
+        </p:nvSpPr>
+        <p:spPr>
+          <a:xfrm>
+            <a:off x="838200" y="365126"/>
+            <a:ext cx="10515600" cy="734332"/>
+          </a:xfrm>
+        </p:spPr>
+        <p:txBody>
+          <a:bodyPr/>
+          <a:lstStyle/>
+          <a:p>
+            <a:pPr algn="ctr"/>
+            <a:r>
+              <a:rPr lang="it-IT" dirty="0" err="1"/>
+              <a:t>Results</a:t>
+            </a:r>
+            <a:r>
+              <a:rPr lang="it-IT" dirty="0"/>
+              <a:t> on the R-Group </a:t>
+            </a:r>
+            <a:r>
+              <a:rPr lang="it-IT" dirty="0" err="1"/>
+              <a:t>instances</a:t>
+            </a:r>
+            <a:endParaRPr lang="it-IT" dirty="0"/>
+          </a:p>
+        </p:txBody>
+      </p:sp>
+      <p:pic>
+        <p:nvPicPr>
+          <p:cNvPr id="7" name="Segnaposto contenuto 6" descr="Immagine che contiene testo, Diagramma, linea, diagramma&#10;&#10;Il contenuto generato dall'IA potrebbe non essere corretto.">
+            <a:extLst>
+              <a:ext uri="{FF2B5EF4-FFF2-40B4-BE49-F238E27FC236}">
+                <a16:creationId xmlns:a16="http://schemas.microsoft.com/office/drawing/2014/main" id="{DADB9E8F-A0C9-0DF4-6A61-930832BBEA72}"/>
+              </a:ext>
+            </a:extLst>
+          </p:cNvPr>
+          <p:cNvPicPr>
+            <a:picLocks noGrp="1" noChangeAspect="1"/>
+          </p:cNvPicPr>
+          <p:nvPr>
+            <p:ph sz="half" idx="2"/>
+          </p:nvPr>
+        </p:nvPicPr>
+        <p:blipFill>
+          <a:blip r:embed="rId2">
+            <a:extLst>
+              <a:ext uri="{28A0092B-C50C-407E-A947-70E740481C1C}">
+                <a14:useLocalDpi xmlns:a14="http://schemas.microsoft.com/office/drawing/2010/main" val="0"/>
+              </a:ext>
+            </a:extLst>
+          </a:blip>
+          <a:stretch>
+            <a:fillRect/>
+          </a:stretch>
+        </p:blipFill>
+        <p:spPr>
+          <a:xfrm>
+            <a:off x="1616528" y="1099458"/>
+            <a:ext cx="8958943" cy="5599339"/>
+          </a:xfrm>
+        </p:spPr>
+      </p:pic>
+    </p:spTree>
+    <p:extLst>
+      <p:ext uri="{BB962C8B-B14F-4D97-AF65-F5344CB8AC3E}">
+        <p14:creationId xmlns:p14="http://schemas.microsoft.com/office/powerpoint/2010/main" val="1656756867"/>
+      </p:ext>
+    </p:extLst>
+  </p:cSld>
+  <p:clrMapOvr>
+    <a:masterClrMapping/>
+  </p:clrMapOvr>
+</p:sld>
+</file>
+
+<file path=ppt/slides/slide14.xml><?xml version="1.0" encoding="utf-8"?>
+<p:sld xmlns:a="http://schemas.openxmlformats.org/drawingml/2006/main" xmlns:r="http://schemas.openxmlformats.org/officeDocument/2006/relationships" xmlns:p="http://schemas.openxmlformats.org/presentationml/2006/main">
+  <p:cSld>
+    <p:spTree>
+      <p:nvGrpSpPr>
+        <p:cNvPr id="1" name="">
+          <a:extLst>
+            <a:ext uri="{FF2B5EF4-FFF2-40B4-BE49-F238E27FC236}">
+              <a16:creationId xmlns:a16="http://schemas.microsoft.com/office/drawing/2014/main" id="{A7A90526-5B70-AE63-8A99-A66368AA7FA0}"/>
+            </a:ext>
+          </a:extLst>
+        </p:cNvPr>
+        <p:cNvGrpSpPr/>
+        <p:nvPr/>
+      </p:nvGrpSpPr>
+      <p:grpSpPr>
+        <a:xfrm>
+          <a:off x="0" y="0"/>
+          <a:ext cx="0" cy="0"/>
+          <a:chOff x="0" y="0"/>
+          <a:chExt cx="0" cy="0"/>
+        </a:xfrm>
+      </p:grpSpPr>
+      <p:sp>
+        <p:nvSpPr>
+          <p:cNvPr id="2" name="Titolo 1">
+            <a:extLst>
+              <a:ext uri="{FF2B5EF4-FFF2-40B4-BE49-F238E27FC236}">
+                <a16:creationId xmlns:a16="http://schemas.microsoft.com/office/drawing/2014/main" id="{AAEA9917-E988-AC61-6C0C-C32E3656BC5C}"/>
+              </a:ext>
+            </a:extLst>
+          </p:cNvPr>
+          <p:cNvSpPr>
+            <a:spLocks noGrp="1"/>
+          </p:cNvSpPr>
+          <p:nvPr>
+            <p:ph type="title"/>
+          </p:nvPr>
+        </p:nvSpPr>
+        <p:spPr>
+          <a:xfrm>
+            <a:off x="838200" y="365126"/>
+            <a:ext cx="10515600" cy="734332"/>
+          </a:xfrm>
+        </p:spPr>
+        <p:txBody>
+          <a:bodyPr/>
+          <a:lstStyle/>
+          <a:p>
+            <a:pPr algn="ctr"/>
+            <a:r>
+              <a:rPr lang="it-IT" dirty="0" err="1"/>
+              <a:t>Results</a:t>
+            </a:r>
+            <a:r>
+              <a:rPr lang="it-IT" dirty="0"/>
+              <a:t> on the R-Group </a:t>
+            </a:r>
+            <a:r>
+              <a:rPr lang="it-IT" dirty="0" err="1"/>
+              <a:t>instances</a:t>
+            </a:r>
+            <a:endParaRPr lang="it-IT" dirty="0"/>
+          </a:p>
+        </p:txBody>
+      </p:sp>
+      <p:sp>
+        <p:nvSpPr>
+          <p:cNvPr id="4" name="Segnaposto contenuto 3">
+            <a:extLst>
+              <a:ext uri="{FF2B5EF4-FFF2-40B4-BE49-F238E27FC236}">
+                <a16:creationId xmlns:a16="http://schemas.microsoft.com/office/drawing/2014/main" id="{DD0C7276-2264-17DB-3F68-64EEBEE7745D}"/>
+              </a:ext>
+            </a:extLst>
+          </p:cNvPr>
+          <p:cNvSpPr>
+            <a:spLocks noGrp="1"/>
+          </p:cNvSpPr>
+          <p:nvPr>
+            <p:ph sz="half" idx="2"/>
+          </p:nvPr>
+        </p:nvSpPr>
+        <p:spPr>
+          <a:xfrm>
+            <a:off x="751114" y="1447800"/>
+            <a:ext cx="10515600" cy="4729163"/>
+          </a:xfrm>
+        </p:spPr>
+        <p:txBody>
+          <a:bodyPr>
+            <a:normAutofit/>
+          </a:bodyPr>
+          <a:lstStyle/>
+          <a:p>
+            <a:r>
+              <a:rPr lang="it-IT" dirty="0"/>
+              <a:t>R </a:t>
+            </a:r>
+            <a:r>
+              <a:rPr lang="it-IT" dirty="0" err="1"/>
+              <a:t>instances</a:t>
+            </a:r>
+            <a:r>
+              <a:rPr lang="it-IT" dirty="0"/>
+              <a:t> </a:t>
+            </a:r>
+            <a:r>
+              <a:rPr lang="it-IT" dirty="0" err="1"/>
+              <a:t>have</a:t>
+            </a:r>
+            <a:r>
+              <a:rPr lang="it-IT" dirty="0"/>
+              <a:t> random locations: the </a:t>
+            </a:r>
+            <a:r>
+              <a:rPr lang="it-IT" dirty="0" err="1"/>
+              <a:t>discrepancy</a:t>
+            </a:r>
+            <a:r>
+              <a:rPr lang="it-IT" dirty="0"/>
+              <a:t> </a:t>
+            </a:r>
+            <a:r>
+              <a:rPr lang="it-IT" dirty="0" err="1"/>
+              <a:t>between</a:t>
+            </a:r>
+            <a:r>
+              <a:rPr lang="it-IT" dirty="0"/>
+              <a:t> the </a:t>
+            </a:r>
+            <a:r>
+              <a:rPr lang="it-IT" dirty="0" err="1"/>
+              <a:t>minimim</a:t>
+            </a:r>
+            <a:r>
+              <a:rPr lang="it-IT" dirty="0"/>
+              <a:t> </a:t>
+            </a:r>
+            <a:r>
+              <a:rPr lang="it-IT" dirty="0" err="1"/>
+              <a:t>distance</a:t>
+            </a:r>
+            <a:r>
+              <a:rPr lang="it-IT" dirty="0"/>
+              <a:t> from and to a location and the </a:t>
+            </a:r>
+            <a:r>
+              <a:rPr lang="it-IT" dirty="0" err="1"/>
+              <a:t>actual</a:t>
+            </a:r>
+            <a:r>
+              <a:rPr lang="it-IT" dirty="0"/>
+              <a:t> cost of a </a:t>
+            </a:r>
+            <a:r>
+              <a:rPr lang="it-IT" dirty="0" err="1"/>
+              <a:t>transition</a:t>
+            </a:r>
+            <a:r>
+              <a:rPr lang="it-IT" dirty="0"/>
+              <a:t> </a:t>
+            </a:r>
+            <a:r>
+              <a:rPr lang="it-IT" dirty="0" err="1"/>
+              <a:t>is</a:t>
+            </a:r>
+            <a:r>
+              <a:rPr lang="it-IT" dirty="0"/>
+              <a:t> </a:t>
+            </a:r>
+            <a:r>
+              <a:rPr lang="it-IT" dirty="0" err="1"/>
+              <a:t>probably</a:t>
+            </a:r>
+            <a:r>
+              <a:rPr lang="it-IT" dirty="0"/>
+              <a:t> </a:t>
+            </a:r>
+            <a:r>
+              <a:rPr lang="it-IT" dirty="0" err="1"/>
+              <a:t>lower</a:t>
+            </a:r>
+            <a:r>
+              <a:rPr lang="it-IT" dirty="0"/>
+              <a:t> </a:t>
+            </a:r>
+            <a:r>
+              <a:rPr lang="it-IT" dirty="0" err="1"/>
+              <a:t>than</a:t>
+            </a:r>
+            <a:r>
+              <a:rPr lang="it-IT" dirty="0"/>
+              <a:t> in the C </a:t>
+            </a:r>
+            <a:r>
+              <a:rPr lang="it-IT" dirty="0" err="1"/>
+              <a:t>instances</a:t>
+            </a:r>
+            <a:r>
+              <a:rPr lang="it-IT" dirty="0"/>
+              <a:t>.</a:t>
+            </a:r>
+          </a:p>
+          <a:p>
+            <a:r>
+              <a:rPr lang="it-IT" dirty="0"/>
+              <a:t>In </a:t>
+            </a:r>
+            <a:r>
+              <a:rPr lang="it-IT" dirty="0" err="1"/>
+              <a:t>this</a:t>
+            </a:r>
+            <a:r>
+              <a:rPr lang="it-IT" dirty="0"/>
+              <a:t> case the dual bounds </a:t>
+            </a:r>
+            <a:r>
+              <a:rPr lang="it-IT" dirty="0" err="1"/>
+              <a:t>actually</a:t>
+            </a:r>
+            <a:r>
+              <a:rPr lang="it-IT" dirty="0"/>
+              <a:t> help the </a:t>
+            </a:r>
+            <a:r>
+              <a:rPr lang="it-IT" dirty="0" err="1"/>
+              <a:t>search</a:t>
+            </a:r>
+            <a:r>
+              <a:rPr lang="it-IT" dirty="0"/>
+              <a:t> </a:t>
+            </a:r>
+            <a:r>
+              <a:rPr lang="it-IT" dirty="0" err="1"/>
+              <a:t>process</a:t>
+            </a:r>
+            <a:r>
+              <a:rPr lang="it-IT" dirty="0"/>
+              <a:t>.</a:t>
+            </a:r>
+          </a:p>
+          <a:p>
+            <a:r>
+              <a:rPr lang="it-IT" dirty="0" err="1"/>
+              <a:t>As</a:t>
+            </a:r>
+            <a:r>
+              <a:rPr lang="it-IT" dirty="0"/>
+              <a:t> for the 1-Group, the </a:t>
+            </a:r>
+            <a:r>
+              <a:rPr lang="it-IT" dirty="0" err="1"/>
+              <a:t>resource</a:t>
+            </a:r>
+            <a:r>
+              <a:rPr lang="it-IT" dirty="0"/>
+              <a:t> </a:t>
+            </a:r>
+            <a:r>
+              <a:rPr lang="it-IT" dirty="0" err="1"/>
+              <a:t>variables</a:t>
+            </a:r>
+            <a:r>
+              <a:rPr lang="it-IT" dirty="0"/>
+              <a:t> make the models </a:t>
+            </a:r>
+            <a:r>
+              <a:rPr lang="it-IT" dirty="0" err="1"/>
+              <a:t>perform</a:t>
+            </a:r>
+            <a:r>
+              <a:rPr lang="it-IT" dirty="0"/>
+              <a:t> </a:t>
+            </a:r>
+            <a:r>
+              <a:rPr lang="it-IT" dirty="0" err="1"/>
+              <a:t>better</a:t>
+            </a:r>
+            <a:r>
+              <a:rPr lang="it-IT" dirty="0"/>
+              <a:t> </a:t>
+            </a:r>
+            <a:r>
+              <a:rPr lang="it-IT" dirty="0" err="1"/>
+              <a:t>independently</a:t>
+            </a:r>
+            <a:r>
+              <a:rPr lang="it-IT" dirty="0"/>
+              <a:t> from the </a:t>
+            </a:r>
+            <a:r>
+              <a:rPr lang="it-IT" dirty="0" err="1"/>
+              <a:t>usage</a:t>
+            </a:r>
+            <a:r>
+              <a:rPr lang="it-IT" dirty="0"/>
+              <a:t> of dual bounds.</a:t>
+            </a:r>
+          </a:p>
+          <a:p>
+            <a:r>
+              <a:rPr lang="it-IT" dirty="0"/>
+              <a:t>The </a:t>
+            </a:r>
+            <a:r>
+              <a:rPr lang="it-IT" dirty="0" err="1"/>
+              <a:t>greatest</a:t>
+            </a:r>
+            <a:r>
+              <a:rPr lang="it-IT" dirty="0"/>
+              <a:t> gap </a:t>
+            </a:r>
+            <a:r>
+              <a:rPr lang="it-IT" dirty="0" err="1"/>
+              <a:t>remains</a:t>
+            </a:r>
+            <a:r>
+              <a:rPr lang="it-IT" dirty="0"/>
+              <a:t> </a:t>
+            </a:r>
+            <a:r>
+              <a:rPr lang="it-IT" dirty="0" err="1"/>
+              <a:t>between</a:t>
+            </a:r>
+            <a:r>
+              <a:rPr lang="it-IT" dirty="0"/>
+              <a:t> CP and DIDP.</a:t>
+            </a:r>
+          </a:p>
+          <a:p>
+            <a:endParaRPr lang="it-IT" dirty="0"/>
+          </a:p>
+        </p:txBody>
+      </p:sp>
+    </p:spTree>
+    <p:extLst>
+      <p:ext uri="{BB962C8B-B14F-4D97-AF65-F5344CB8AC3E}">
+        <p14:creationId xmlns:p14="http://schemas.microsoft.com/office/powerpoint/2010/main" val="930047647"/>
+      </p:ext>
+    </p:extLst>
+  </p:cSld>
+  <p:clrMapOvr>
+    <a:masterClrMapping/>
+  </p:clrMapOvr>
+</p:sld>
+</file>
+
+<file path=ppt/slides/slide15.xml><?xml version="1.0" encoding="utf-8"?>
+<p:sld xmlns:a="http://schemas.openxmlformats.org/drawingml/2006/main" xmlns:r="http://schemas.openxmlformats.org/officeDocument/2006/relationships" xmlns:p="http://schemas.openxmlformats.org/presentationml/2006/main">
+  <p:cSld>
+    <p:spTree>
+      <p:nvGrpSpPr>
+        <p:cNvPr id="1" name="">
+          <a:extLst>
+            <a:ext uri="{FF2B5EF4-FFF2-40B4-BE49-F238E27FC236}">
+              <a16:creationId xmlns:a16="http://schemas.microsoft.com/office/drawing/2014/main" id="{FFEBB846-65FC-7958-36CC-36E67CD15A04}"/>
+            </a:ext>
+          </a:extLst>
+        </p:cNvPr>
+        <p:cNvGrpSpPr/>
+        <p:nvPr/>
+      </p:nvGrpSpPr>
+      <p:grpSpPr>
+        <a:xfrm>
+          <a:off x="0" y="0"/>
+          <a:ext cx="0" cy="0"/>
+          <a:chOff x="0" y="0"/>
+          <a:chExt cx="0" cy="0"/>
+        </a:xfrm>
+      </p:grpSpPr>
+      <p:sp>
+        <p:nvSpPr>
+          <p:cNvPr id="2" name="Titolo 1">
+            <a:extLst>
+              <a:ext uri="{FF2B5EF4-FFF2-40B4-BE49-F238E27FC236}">
+                <a16:creationId xmlns:a16="http://schemas.microsoft.com/office/drawing/2014/main" id="{DE804DA4-CB6E-C786-8480-639BE5C2913F}"/>
+              </a:ext>
+            </a:extLst>
+          </p:cNvPr>
+          <p:cNvSpPr>
+            <a:spLocks noGrp="1"/>
+          </p:cNvSpPr>
+          <p:nvPr>
+            <p:ph type="title"/>
+          </p:nvPr>
+        </p:nvSpPr>
+        <p:spPr>
+          <a:xfrm>
+            <a:off x="838200" y="365126"/>
+            <a:ext cx="10515600" cy="734332"/>
+          </a:xfrm>
+        </p:spPr>
+        <p:txBody>
+          <a:bodyPr/>
+          <a:lstStyle/>
+          <a:p>
+            <a:pPr algn="ctr"/>
+            <a:r>
+              <a:rPr lang="it-IT" dirty="0" err="1"/>
+              <a:t>Results</a:t>
+            </a:r>
+            <a:r>
+              <a:rPr lang="it-IT" dirty="0"/>
+              <a:t> on the RC-Group </a:t>
+            </a:r>
+            <a:r>
+              <a:rPr lang="it-IT" dirty="0" err="1"/>
+              <a:t>instances</a:t>
+            </a:r>
+            <a:endParaRPr lang="it-IT" dirty="0"/>
+          </a:p>
+        </p:txBody>
+      </p:sp>
+      <p:pic>
+        <p:nvPicPr>
+          <p:cNvPr id="6" name="Segnaposto contenuto 5" descr="Immagine che contiene testo, Diagramma, linea, diagramma&#10;&#10;Il contenuto generato dall'IA potrebbe non essere corretto.">
+            <a:extLst>
+              <a:ext uri="{FF2B5EF4-FFF2-40B4-BE49-F238E27FC236}">
+                <a16:creationId xmlns:a16="http://schemas.microsoft.com/office/drawing/2014/main" id="{68307069-801E-F89C-2D3A-C941922B371A}"/>
+              </a:ext>
+            </a:extLst>
+          </p:cNvPr>
+          <p:cNvPicPr>
+            <a:picLocks noGrp="1" noChangeAspect="1"/>
+          </p:cNvPicPr>
+          <p:nvPr>
+            <p:ph sz="half" idx="2"/>
+          </p:nvPr>
+        </p:nvPicPr>
+        <p:blipFill>
+          <a:blip r:embed="rId2">
+            <a:extLst>
+              <a:ext uri="{28A0092B-C50C-407E-A947-70E740481C1C}">
+                <a14:useLocalDpi xmlns:a14="http://schemas.microsoft.com/office/drawing/2010/main" val="0"/>
+              </a:ext>
+            </a:extLst>
+          </a:blip>
+          <a:stretch>
+            <a:fillRect/>
+          </a:stretch>
+        </p:blipFill>
+        <p:spPr>
+          <a:xfrm>
+            <a:off x="1524000" y="1099458"/>
+            <a:ext cx="9144000" cy="5715000"/>
+          </a:xfrm>
+        </p:spPr>
+      </p:pic>
+    </p:spTree>
+    <p:extLst>
+      <p:ext uri="{BB962C8B-B14F-4D97-AF65-F5344CB8AC3E}">
+        <p14:creationId xmlns:p14="http://schemas.microsoft.com/office/powerpoint/2010/main" val="4283797210"/>
+      </p:ext>
+    </p:extLst>
+  </p:cSld>
+  <p:clrMapOvr>
+    <a:masterClrMapping/>
+  </p:clrMapOvr>
+</p:sld>
+</file>
+
+<file path=ppt/slides/slide16.xml><?xml version="1.0" encoding="utf-8"?>
+<p:sld xmlns:a="http://schemas.openxmlformats.org/drawingml/2006/main" xmlns:r="http://schemas.openxmlformats.org/officeDocument/2006/relationships" xmlns:p="http://schemas.openxmlformats.org/presentationml/2006/main">
+  <p:cSld>
+    <p:spTree>
+      <p:nvGrpSpPr>
+        <p:cNvPr id="1" name="">
+          <a:extLst>
+            <a:ext uri="{FF2B5EF4-FFF2-40B4-BE49-F238E27FC236}">
+              <a16:creationId xmlns:a16="http://schemas.microsoft.com/office/drawing/2014/main" id="{CEAD57FE-80F8-31E5-DF65-663631B1E618}"/>
+            </a:ext>
+          </a:extLst>
+        </p:cNvPr>
+        <p:cNvGrpSpPr/>
+        <p:nvPr/>
+      </p:nvGrpSpPr>
+      <p:grpSpPr>
+        <a:xfrm>
+          <a:off x="0" y="0"/>
+          <a:ext cx="0" cy="0"/>
+          <a:chOff x="0" y="0"/>
+          <a:chExt cx="0" cy="0"/>
+        </a:xfrm>
+      </p:grpSpPr>
+      <p:sp>
+        <p:nvSpPr>
+          <p:cNvPr id="2" name="Titolo 1">
+            <a:extLst>
+              <a:ext uri="{FF2B5EF4-FFF2-40B4-BE49-F238E27FC236}">
+                <a16:creationId xmlns:a16="http://schemas.microsoft.com/office/drawing/2014/main" id="{89D7B5F4-B415-63D2-A351-53109947CD47}"/>
+              </a:ext>
+            </a:extLst>
+          </p:cNvPr>
+          <p:cNvSpPr>
+            <a:spLocks noGrp="1"/>
+          </p:cNvSpPr>
+          <p:nvPr>
+            <p:ph type="title"/>
+          </p:nvPr>
+        </p:nvSpPr>
+        <p:spPr>
+          <a:xfrm>
+            <a:off x="838200" y="365126"/>
+            <a:ext cx="10515600" cy="734332"/>
+          </a:xfrm>
+        </p:spPr>
+        <p:txBody>
+          <a:bodyPr/>
+          <a:lstStyle/>
+          <a:p>
+            <a:pPr algn="ctr"/>
+            <a:r>
+              <a:rPr lang="it-IT" dirty="0" err="1"/>
+              <a:t>Results</a:t>
+            </a:r>
+            <a:r>
+              <a:rPr lang="it-IT" dirty="0"/>
+              <a:t> on the RC-Group </a:t>
+            </a:r>
+            <a:r>
+              <a:rPr lang="it-IT" dirty="0" err="1"/>
+              <a:t>instances</a:t>
+            </a:r>
+            <a:endParaRPr lang="it-IT" dirty="0"/>
+          </a:p>
+        </p:txBody>
+      </p:sp>
+      <p:sp>
+        <p:nvSpPr>
+          <p:cNvPr id="4" name="Segnaposto contenuto 3">
+            <a:extLst>
+              <a:ext uri="{FF2B5EF4-FFF2-40B4-BE49-F238E27FC236}">
+                <a16:creationId xmlns:a16="http://schemas.microsoft.com/office/drawing/2014/main" id="{1529DD47-D085-7E70-627C-0882281D3C98}"/>
+              </a:ext>
+            </a:extLst>
+          </p:cNvPr>
+          <p:cNvSpPr>
+            <a:spLocks noGrp="1"/>
+          </p:cNvSpPr>
+          <p:nvPr>
+            <p:ph sz="half" idx="2"/>
+          </p:nvPr>
+        </p:nvSpPr>
+        <p:spPr>
+          <a:xfrm>
+            <a:off x="751114" y="1447800"/>
+            <a:ext cx="10515600" cy="4729163"/>
+          </a:xfrm>
+        </p:spPr>
+        <p:txBody>
+          <a:bodyPr>
+            <a:normAutofit/>
+          </a:bodyPr>
+          <a:lstStyle/>
+          <a:p>
+            <a:r>
+              <a:rPr lang="it-IT" dirty="0" err="1"/>
+              <a:t>As</a:t>
+            </a:r>
+            <a:r>
+              <a:rPr lang="it-IT" dirty="0"/>
+              <a:t> for the C-group, the model </a:t>
+            </a:r>
+            <a:r>
+              <a:rPr lang="it-IT" dirty="0" err="1"/>
+              <a:t>without</a:t>
+            </a:r>
+            <a:r>
+              <a:rPr lang="it-IT" dirty="0"/>
+              <a:t> the bounds and with the </a:t>
+            </a:r>
+            <a:r>
+              <a:rPr lang="it-IT" dirty="0" err="1"/>
+              <a:t>resource</a:t>
+            </a:r>
+            <a:r>
+              <a:rPr lang="it-IT" dirty="0"/>
+              <a:t> </a:t>
+            </a:r>
+            <a:r>
+              <a:rPr lang="it-IT" dirty="0" err="1"/>
+              <a:t>variables</a:t>
+            </a:r>
+            <a:r>
+              <a:rPr lang="it-IT" dirty="0"/>
+              <a:t> </a:t>
+            </a:r>
+            <a:r>
+              <a:rPr lang="it-IT" dirty="0" err="1"/>
+              <a:t>is</a:t>
+            </a:r>
+            <a:r>
+              <a:rPr lang="it-IT" dirty="0"/>
+              <a:t> the best </a:t>
+            </a:r>
+            <a:r>
+              <a:rPr lang="it-IT" dirty="0" err="1"/>
+              <a:t>among</a:t>
+            </a:r>
+            <a:r>
+              <a:rPr lang="it-IT" dirty="0"/>
+              <a:t> the DIDP models.</a:t>
+            </a:r>
+          </a:p>
+          <a:p>
+            <a:r>
+              <a:rPr lang="it-IT" dirty="0"/>
+              <a:t>The </a:t>
+            </a:r>
+            <a:r>
+              <a:rPr lang="it-IT" dirty="0" err="1"/>
+              <a:t>difference</a:t>
+            </a:r>
+            <a:r>
+              <a:rPr lang="it-IT" dirty="0"/>
+              <a:t> in the performances </a:t>
+            </a:r>
+            <a:r>
+              <a:rPr lang="it-IT" dirty="0" err="1"/>
+              <a:t>is</a:t>
+            </a:r>
+            <a:r>
+              <a:rPr lang="it-IT" dirty="0"/>
+              <a:t> </a:t>
+            </a:r>
+            <a:r>
+              <a:rPr lang="it-IT" dirty="0" err="1"/>
+              <a:t>mitigated</a:t>
+            </a:r>
+            <a:r>
+              <a:rPr lang="it-IT" dirty="0"/>
+              <a:t> by the </a:t>
+            </a:r>
+            <a:r>
+              <a:rPr lang="it-IT" dirty="0" err="1"/>
+              <a:t>fact</a:t>
+            </a:r>
+            <a:r>
+              <a:rPr lang="it-IT" dirty="0"/>
+              <a:t> </a:t>
+            </a:r>
+            <a:r>
+              <a:rPr lang="it-IT" dirty="0" err="1"/>
+              <a:t>that</a:t>
+            </a:r>
+            <a:r>
+              <a:rPr lang="it-IT" dirty="0"/>
+              <a:t> </a:t>
+            </a:r>
+            <a:r>
+              <a:rPr lang="it-IT" dirty="0" err="1"/>
+              <a:t>only</a:t>
+            </a:r>
+            <a:r>
+              <a:rPr lang="it-IT" dirty="0"/>
+              <a:t> part of the customers are </a:t>
+            </a:r>
+            <a:r>
+              <a:rPr lang="it-IT" dirty="0" err="1"/>
+              <a:t>clustered</a:t>
+            </a:r>
+            <a:r>
+              <a:rPr lang="it-IT" dirty="0"/>
+              <a:t>.</a:t>
+            </a:r>
+          </a:p>
+        </p:txBody>
+      </p:sp>
+    </p:spTree>
+    <p:extLst>
+      <p:ext uri="{BB962C8B-B14F-4D97-AF65-F5344CB8AC3E}">
+        <p14:creationId xmlns:p14="http://schemas.microsoft.com/office/powerpoint/2010/main" val="2469393461"/>
+      </p:ext>
+    </p:extLst>
+  </p:cSld>
+  <p:clrMapOvr>
+    <a:masterClrMapping/>
+  </p:clrMapOvr>
+</p:sld>
+</file>
+
+<file path=ppt/slides/slide17.xml><?xml version="1.0" encoding="utf-8"?>
+<p:sld xmlns:a="http://schemas.openxmlformats.org/drawingml/2006/main" xmlns:r="http://schemas.openxmlformats.org/officeDocument/2006/relationships" xmlns:p="http://schemas.openxmlformats.org/presentationml/2006/main">
+  <p:cSld>
+    <p:spTree>
+      <p:nvGrpSpPr>
+        <p:cNvPr id="1" name="">
+          <a:extLst>
+            <a:ext uri="{FF2B5EF4-FFF2-40B4-BE49-F238E27FC236}">
+              <a16:creationId xmlns:a16="http://schemas.microsoft.com/office/drawing/2014/main" id="{3C68A0D2-18B6-B315-4E2A-09D2016993C6}"/>
+            </a:ext>
+          </a:extLst>
+        </p:cNvPr>
+        <p:cNvGrpSpPr/>
+        <p:nvPr/>
+      </p:nvGrpSpPr>
+      <p:grpSpPr>
+        <a:xfrm>
+          <a:off x="0" y="0"/>
+          <a:ext cx="0" cy="0"/>
+          <a:chOff x="0" y="0"/>
+          <a:chExt cx="0" cy="0"/>
+        </a:xfrm>
+      </p:grpSpPr>
+      <p:sp>
+        <p:nvSpPr>
+          <p:cNvPr id="2" name="Titolo 1">
+            <a:extLst>
+              <a:ext uri="{FF2B5EF4-FFF2-40B4-BE49-F238E27FC236}">
+                <a16:creationId xmlns:a16="http://schemas.microsoft.com/office/drawing/2014/main" id="{E4094EB6-08CE-11CC-030B-8CFF2A93014C}"/>
+              </a:ext>
+            </a:extLst>
+          </p:cNvPr>
+          <p:cNvSpPr>
+            <a:spLocks noGrp="1"/>
+          </p:cNvSpPr>
+          <p:nvPr>
+            <p:ph type="title"/>
+          </p:nvPr>
+        </p:nvSpPr>
+        <p:spPr>
+          <a:xfrm>
+            <a:off x="838200" y="365126"/>
+            <a:ext cx="10515600" cy="734332"/>
+          </a:xfrm>
+        </p:spPr>
+        <p:txBody>
+          <a:bodyPr/>
+          <a:lstStyle/>
+          <a:p>
+            <a:pPr algn="ctr"/>
+            <a:r>
+              <a:rPr lang="it-IT" dirty="0"/>
+              <a:t>Total </a:t>
+            </a:r>
+            <a:r>
+              <a:rPr lang="it-IT" dirty="0" err="1"/>
+              <a:t>perfomances</a:t>
+            </a:r>
+            <a:endParaRPr lang="it-IT" dirty="0"/>
+          </a:p>
+        </p:txBody>
+      </p:sp>
+      <p:pic>
+        <p:nvPicPr>
+          <p:cNvPr id="6" name="Segnaposto contenuto 5" descr="Immagine che contiene testo, Diagramma, linea, schermata&#10;&#10;Il contenuto generato dall'IA potrebbe non essere corretto.">
+            <a:extLst>
+              <a:ext uri="{FF2B5EF4-FFF2-40B4-BE49-F238E27FC236}">
+                <a16:creationId xmlns:a16="http://schemas.microsoft.com/office/drawing/2014/main" id="{6CB75469-2E39-927E-BD44-C8103E2FCF95}"/>
+              </a:ext>
+            </a:extLst>
+          </p:cNvPr>
+          <p:cNvPicPr>
+            <a:picLocks noGrp="1" noChangeAspect="1"/>
+          </p:cNvPicPr>
+          <p:nvPr>
+            <p:ph sz="half" idx="2"/>
+          </p:nvPr>
+        </p:nvPicPr>
+        <p:blipFill>
+          <a:blip r:embed="rId2">
+            <a:extLst>
+              <a:ext uri="{28A0092B-C50C-407E-A947-70E740481C1C}">
+                <a14:useLocalDpi xmlns:a14="http://schemas.microsoft.com/office/drawing/2010/main" val="0"/>
+              </a:ext>
+            </a:extLst>
+          </a:blip>
+          <a:stretch>
+            <a:fillRect/>
+          </a:stretch>
+        </p:blipFill>
+        <p:spPr>
+          <a:xfrm>
+            <a:off x="1584959" y="1099458"/>
+            <a:ext cx="9022081" cy="5638800"/>
+          </a:xfrm>
+        </p:spPr>
+      </p:pic>
+    </p:spTree>
+    <p:extLst>
+      <p:ext uri="{BB962C8B-B14F-4D97-AF65-F5344CB8AC3E}">
+        <p14:creationId xmlns:p14="http://schemas.microsoft.com/office/powerpoint/2010/main" val="1529424962"/>
+      </p:ext>
+    </p:extLst>
+  </p:cSld>
+  <p:clrMapOvr>
+    <a:masterClrMapping/>
+  </p:clrMapOvr>
+</p:sld>
+</file>
+
+<file path=ppt/slides/slide18.xml><?xml version="1.0" encoding="utf-8"?>
+<p:sld xmlns:a="http://schemas.openxmlformats.org/drawingml/2006/main" xmlns:r="http://schemas.openxmlformats.org/officeDocument/2006/relationships" xmlns:p="http://schemas.openxmlformats.org/presentationml/2006/main">
+  <p:cSld>
+    <p:spTree>
+      <p:nvGrpSpPr>
+        <p:cNvPr id="1" name=""/>
+        <p:cNvGrpSpPr/>
+        <p:nvPr/>
+      </p:nvGrpSpPr>
+      <p:grpSpPr>
+        <a:xfrm>
+          <a:off x="0" y="0"/>
+          <a:ext cx="0" cy="0"/>
+          <a:chOff x="0" y="0"/>
+          <a:chExt cx="0" cy="0"/>
+        </a:xfrm>
+      </p:grpSpPr>
+      <p:sp>
+        <p:nvSpPr>
+          <p:cNvPr id="2" name="Titolo 1">
+            <a:extLst>
+              <a:ext uri="{FF2B5EF4-FFF2-40B4-BE49-F238E27FC236}">
+                <a16:creationId xmlns:a16="http://schemas.microsoft.com/office/drawing/2014/main" id="{A3AEFFFB-FDDE-2406-F781-1F52FB37D976}"/>
+              </a:ext>
+            </a:extLst>
+          </p:cNvPr>
+          <p:cNvSpPr>
+            <a:spLocks noGrp="1"/>
+          </p:cNvSpPr>
+          <p:nvPr>
+            <p:ph type="title"/>
+          </p:nvPr>
+        </p:nvSpPr>
+        <p:spPr>
+          <a:xfrm>
+            <a:off x="838200" y="365125"/>
+            <a:ext cx="10515600" cy="843189"/>
+          </a:xfrm>
+        </p:spPr>
+        <p:txBody>
+          <a:bodyPr/>
+          <a:lstStyle/>
+          <a:p>
+            <a:pPr algn="ctr"/>
+            <a:r>
+              <a:rPr lang="it-IT" dirty="0"/>
+              <a:t>Total performances</a:t>
+            </a:r>
+          </a:p>
+        </p:txBody>
+      </p:sp>
+      <p:sp>
+        <p:nvSpPr>
+          <p:cNvPr id="3" name="Segnaposto contenuto 2">
+            <a:extLst>
+              <a:ext uri="{FF2B5EF4-FFF2-40B4-BE49-F238E27FC236}">
+                <a16:creationId xmlns:a16="http://schemas.microsoft.com/office/drawing/2014/main" id="{6E2638FA-B96A-8773-3AB9-552DF94670BE}"/>
+              </a:ext>
+            </a:extLst>
+          </p:cNvPr>
+          <p:cNvSpPr>
+            <a:spLocks noGrp="1"/>
+          </p:cNvSpPr>
+          <p:nvPr>
+            <p:ph idx="1"/>
+          </p:nvPr>
+        </p:nvSpPr>
+        <p:spPr>
+          <a:xfrm>
+            <a:off x="838200" y="1447800"/>
+            <a:ext cx="10515600" cy="4729163"/>
+          </a:xfrm>
+        </p:spPr>
+        <p:txBody>
+          <a:bodyPr/>
+          <a:lstStyle/>
+          <a:p>
+            <a:r>
+              <a:rPr lang="it-IT" dirty="0"/>
+              <a:t>CP </a:t>
+            </a:r>
+            <a:r>
+              <a:rPr lang="it-IT" dirty="0" err="1"/>
+              <a:t>outperforms</a:t>
+            </a:r>
+            <a:r>
+              <a:rPr lang="it-IT" dirty="0"/>
+              <a:t> </a:t>
+            </a:r>
+            <a:r>
+              <a:rPr lang="it-IT" dirty="0" err="1"/>
+              <a:t>all</a:t>
+            </a:r>
+            <a:r>
+              <a:rPr lang="it-IT" dirty="0"/>
+              <a:t> the DIDP models</a:t>
+            </a:r>
+          </a:p>
+          <a:p>
+            <a:r>
+              <a:rPr lang="it-IT" dirty="0"/>
+              <a:t>The </a:t>
+            </a:r>
+            <a:r>
+              <a:rPr lang="it-IT" dirty="0" err="1"/>
+              <a:t>difference</a:t>
+            </a:r>
+            <a:r>
+              <a:rPr lang="it-IT" dirty="0"/>
+              <a:t> in overall performances </a:t>
+            </a:r>
+            <a:r>
+              <a:rPr lang="it-IT" dirty="0" err="1"/>
+              <a:t>between</a:t>
+            </a:r>
+            <a:r>
+              <a:rPr lang="it-IT" dirty="0"/>
+              <a:t> the DIDP models </a:t>
+            </a:r>
+            <a:r>
+              <a:rPr lang="it-IT" dirty="0" err="1"/>
+              <a:t>is</a:t>
+            </a:r>
+            <a:r>
+              <a:rPr lang="it-IT" dirty="0"/>
+              <a:t> </a:t>
+            </a:r>
+            <a:r>
+              <a:rPr lang="it-IT" dirty="0" err="1"/>
+              <a:t>not</a:t>
+            </a:r>
+            <a:r>
+              <a:rPr lang="it-IT" dirty="0"/>
+              <a:t> so big, </a:t>
+            </a:r>
+            <a:r>
+              <a:rPr lang="it-IT" dirty="0" err="1"/>
+              <a:t>but</a:t>
+            </a:r>
+            <a:r>
+              <a:rPr lang="it-IT" dirty="0"/>
+              <a:t> </a:t>
+            </a:r>
+            <a:r>
+              <a:rPr lang="it-IT" dirty="0" err="1"/>
+              <a:t>we</a:t>
+            </a:r>
+            <a:r>
+              <a:rPr lang="it-IT" dirty="0"/>
+              <a:t> can state </a:t>
+            </a:r>
+            <a:r>
+              <a:rPr lang="it-IT" dirty="0" err="1"/>
+              <a:t>that</a:t>
+            </a:r>
+            <a:r>
+              <a:rPr lang="it-IT" dirty="0"/>
+              <a:t>:</a:t>
+            </a:r>
+          </a:p>
+          <a:p>
+            <a:pPr lvl="1">
+              <a:buFont typeface="Wingdings" panose="05000000000000000000" pitchFamily="2" charset="2"/>
+              <a:buChar char="§"/>
+            </a:pPr>
+            <a:r>
+              <a:rPr lang="it-IT" dirty="0"/>
+              <a:t>For </a:t>
+            </a:r>
+            <a:r>
+              <a:rPr lang="it-IT" dirty="0" err="1"/>
+              <a:t>most</a:t>
+            </a:r>
+            <a:r>
+              <a:rPr lang="it-IT" dirty="0"/>
+              <a:t> of the </a:t>
+            </a:r>
+            <a:r>
+              <a:rPr lang="it-IT" dirty="0" err="1"/>
+              <a:t>instances</a:t>
+            </a:r>
+            <a:r>
+              <a:rPr lang="it-IT" dirty="0"/>
+              <a:t> the dual bounds are </a:t>
+            </a:r>
+            <a:r>
+              <a:rPr lang="it-IT" dirty="0" err="1"/>
+              <a:t>not</a:t>
+            </a:r>
+            <a:r>
+              <a:rPr lang="it-IT" dirty="0"/>
+              <a:t> good for </a:t>
+            </a:r>
+            <a:r>
+              <a:rPr lang="it-IT" dirty="0" err="1"/>
+              <a:t>search</a:t>
+            </a:r>
+            <a:r>
+              <a:rPr lang="it-IT" dirty="0"/>
+              <a:t> </a:t>
+            </a:r>
+            <a:r>
+              <a:rPr lang="it-IT" dirty="0" err="1"/>
+              <a:t>guidance</a:t>
+            </a:r>
+            <a:r>
+              <a:rPr lang="it-IT" dirty="0"/>
+              <a:t>.</a:t>
+            </a:r>
+          </a:p>
+          <a:p>
+            <a:pPr lvl="1">
+              <a:buFont typeface="Wingdings" panose="05000000000000000000" pitchFamily="2" charset="2"/>
+              <a:buChar char="§"/>
+            </a:pPr>
+            <a:r>
+              <a:rPr lang="it-IT" dirty="0" err="1"/>
+              <a:t>If</a:t>
+            </a:r>
+            <a:r>
+              <a:rPr lang="it-IT" dirty="0"/>
+              <a:t> the </a:t>
+            </a:r>
+            <a:r>
+              <a:rPr lang="it-IT" dirty="0" err="1"/>
+              <a:t>only</a:t>
+            </a:r>
+            <a:r>
+              <a:rPr lang="it-IT" dirty="0"/>
+              <a:t> </a:t>
+            </a:r>
+            <a:r>
+              <a:rPr lang="it-IT" dirty="0" err="1"/>
+              <a:t>difference</a:t>
+            </a:r>
+            <a:r>
+              <a:rPr lang="it-IT" dirty="0"/>
+              <a:t> </a:t>
+            </a:r>
+            <a:r>
+              <a:rPr lang="it-IT" dirty="0" err="1"/>
+              <a:t>between</a:t>
+            </a:r>
+            <a:r>
+              <a:rPr lang="it-IT" dirty="0"/>
+              <a:t> </a:t>
+            </a:r>
+            <a:r>
+              <a:rPr lang="it-IT" dirty="0" err="1"/>
+              <a:t>two</a:t>
+            </a:r>
+            <a:r>
+              <a:rPr lang="it-IT" dirty="0"/>
+              <a:t> models </a:t>
+            </a:r>
+            <a:r>
+              <a:rPr lang="it-IT" dirty="0" err="1"/>
+              <a:t>is</a:t>
+            </a:r>
+            <a:r>
+              <a:rPr lang="it-IT" dirty="0"/>
+              <a:t> the </a:t>
+            </a:r>
+            <a:r>
+              <a:rPr lang="it-IT" dirty="0" err="1"/>
+              <a:t>usage</a:t>
+            </a:r>
+            <a:r>
+              <a:rPr lang="it-IT" dirty="0"/>
+              <a:t> of </a:t>
+            </a:r>
+            <a:r>
+              <a:rPr lang="it-IT" dirty="0" err="1"/>
+              <a:t>resource</a:t>
+            </a:r>
+            <a:r>
+              <a:rPr lang="it-IT" dirty="0"/>
+              <a:t> </a:t>
+            </a:r>
+            <a:r>
+              <a:rPr lang="it-IT" dirty="0" err="1"/>
+              <a:t>variables</a:t>
+            </a:r>
+            <a:r>
+              <a:rPr lang="it-IT" dirty="0"/>
+              <a:t>, the one </a:t>
+            </a:r>
+            <a:r>
+              <a:rPr lang="it-IT" dirty="0" err="1"/>
+              <a:t>exploiting</a:t>
+            </a:r>
+            <a:r>
+              <a:rPr lang="it-IT" dirty="0"/>
+              <a:t> </a:t>
+            </a:r>
+            <a:r>
+              <a:rPr lang="it-IT" dirty="0" err="1"/>
+              <a:t>them</a:t>
+            </a:r>
+            <a:r>
+              <a:rPr lang="it-IT" dirty="0"/>
+              <a:t> </a:t>
+            </a:r>
+            <a:r>
+              <a:rPr lang="it-IT" dirty="0" err="1"/>
+              <a:t>has</a:t>
+            </a:r>
+            <a:r>
+              <a:rPr lang="it-IT" dirty="0"/>
+              <a:t> </a:t>
+            </a:r>
+            <a:r>
+              <a:rPr lang="it-IT" dirty="0" err="1"/>
+              <a:t>better</a:t>
+            </a:r>
+            <a:r>
+              <a:rPr lang="it-IT" dirty="0"/>
+              <a:t> performances </a:t>
+            </a:r>
+            <a:r>
+              <a:rPr lang="it-IT" dirty="0" err="1"/>
+              <a:t>than</a:t>
+            </a:r>
+            <a:r>
+              <a:rPr lang="it-IT" dirty="0"/>
+              <a:t> the </a:t>
+            </a:r>
+            <a:r>
+              <a:rPr lang="it-IT" dirty="0" err="1"/>
+              <a:t>other</a:t>
+            </a:r>
+            <a:r>
+              <a:rPr lang="it-IT" dirty="0"/>
+              <a:t>.</a:t>
+            </a:r>
+            <a:br>
+              <a:rPr lang="it-IT" dirty="0"/>
+            </a:br>
+            <a:endParaRPr lang="it-IT" dirty="0"/>
+          </a:p>
+        </p:txBody>
+      </p:sp>
+    </p:spTree>
+    <p:extLst>
+      <p:ext uri="{BB962C8B-B14F-4D97-AF65-F5344CB8AC3E}">
+        <p14:creationId xmlns:p14="http://schemas.microsoft.com/office/powerpoint/2010/main" val="3148590285"/>
       </p:ext>
     </p:extLst>
   </p:cSld>
@@ -4550,8 +6756,8 @@
           </a:p>
         </p:txBody>
       </p:sp>
-      <mc:AlternateContent xmlns:mc="http://schemas.openxmlformats.org/markup-compatibility/2006">
-        <mc:Choice xmlns:a14="http://schemas.microsoft.com/office/drawing/2010/main" Requires="a14">
+      <mc:AlternateContent xmlns:mc="http://schemas.openxmlformats.org/markup-compatibility/2006" xmlns:a14="http://schemas.microsoft.com/office/drawing/2010/main">
+        <mc:Choice Requires="a14">
           <p:sp>
             <p:nvSpPr>
               <p:cNvPr id="4" name="テキスト ボックス 5">
@@ -5813,21 +8019,7 @@
                                       <a:latin typeface="Cambria Math" panose="02040503050406030204" pitchFamily="18" charset="0"/>
                                       <a:ea typeface="Cambria Math" panose="02040503050406030204" pitchFamily="18" charset="0"/>
                                     </a:rPr>
-                                    <m:t>        </m:t>
-                                  </m:r>
-                                  <m:r>
-                                    <a:rPr lang="it-IT" sz="1875" b="0" i="1" smtClean="0">
-                                      <a:latin typeface="Cambria Math" panose="02040503050406030204" pitchFamily="18" charset="0"/>
-                                      <a:ea typeface="Cambria Math" panose="02040503050406030204" pitchFamily="18" charset="0"/>
-                                    </a:rPr>
-                                    <m:t>     </m:t>
-                                  </m:r>
-                                  <m:r>
-                                    <a:rPr lang="it-IT" sz="1875" b="0" i="1" smtClean="0">
-                                      <a:latin typeface="Cambria Math" panose="02040503050406030204" pitchFamily="18" charset="0"/>
-                                      <a:ea typeface="Cambria Math" panose="02040503050406030204" pitchFamily="18" charset="0"/>
-                                    </a:rPr>
-                                    <m:t>   </m:t>
+                                    <m:t>                </m:t>
                                   </m:r>
                                   <m:r>
                                     <a:rPr lang="it-IT" sz="1875" b="0" i="1" smtClean="0">
@@ -6657,14 +8849,7 @@
                                       <a:latin typeface="Cambria Math" panose="02040503050406030204" pitchFamily="18" charset="0"/>
                                       <a:ea typeface="Cambria Math" panose="02040503050406030204" pitchFamily="18" charset="0"/>
                                     </a:rPr>
-                                    <m:t>0                                                                           </m:t>
-                                  </m:r>
-                                  <m:r>
-                                    <a:rPr lang="it-IT" sz="1875" b="0" i="1" smtClean="0">
-                                      <a:latin typeface="Cambria Math" panose="02040503050406030204" pitchFamily="18" charset="0"/>
-                                      <a:ea typeface="Cambria Math" panose="02040503050406030204" pitchFamily="18" charset="0"/>
-                                    </a:rPr>
-                                    <m:t>                                                                                    </m:t>
+                                    <m:t>0                                                                                                                                                               </m:t>
                                   </m:r>
                                   <m:r>
                                     <a:rPr lang="it-IT" sz="1875" i="1">
@@ -6739,7 +8924,7 @@
             </p:txBody>
           </p:sp>
         </mc:Choice>
-        <mc:Fallback>
+        <mc:Fallback xmlns="">
           <p:sp>
             <p:nvSpPr>
               <p:cNvPr id="4" name="テキスト ボックス 5">
@@ -7146,13 +9331,7 @@
                       <a:rPr lang="it-IT" b="0" i="0" smtClean="0">
                         <a:latin typeface="Cambria Math" panose="02040503050406030204" pitchFamily="18" charset="0"/>
                       </a:rPr>
-                      <m:t> </m:t>
-                    </m:r>
-                    <m:r>
-                      <a:rPr lang="it-IT" b="0" i="0" smtClean="0">
-                        <a:latin typeface="Cambria Math" panose="02040503050406030204" pitchFamily="18" charset="0"/>
-                      </a:rPr>
-                      <m:t> </m:t>
+                      <m:t>  </m:t>
                     </m:r>
                     <m:r>
                       <m:rPr>
@@ -8126,7 +10305,7 @@
                           <a:latin typeface="Cambria Math" panose="02040503050406030204" pitchFamily="18" charset="0"/>
                           <a:ea typeface="Cambria Math" panose="02040503050406030204" pitchFamily="18" charset="0"/>
                         </a:rPr>
-                        <m:t>&lt;</m:t>
+                        <m:t>≤</m:t>
                       </m:r>
                       <m:nary>
                         <m:naryPr>
@@ -8356,11 +10535,11 @@
                         </m:sub>
                       </m:sSub>
                       <m:r>
-                        <a:rPr lang="it-IT" b="0" i="1" smtClean="0">
+                        <a:rPr lang="it-IT" i="1">
                           <a:latin typeface="Cambria Math" panose="02040503050406030204" pitchFamily="18" charset="0"/>
                           <a:ea typeface="Cambria Math" panose="02040503050406030204" pitchFamily="18" charset="0"/>
                         </a:rPr>
-                        <m:t>&lt;</m:t>
+                        <m:t>≤</m:t>
                       </m:r>
                       <m:sSub>
                         <m:sSubPr>
@@ -8653,15 +10832,7 @@
             </a:r>
             <a:r>
               <a:rPr lang="it-IT" dirty="0"/>
-              <a:t> with </a:t>
-            </a:r>
-            <a:r>
-              <a:rPr lang="it-IT"/>
-              <a:t>LNBS solver </a:t>
-            </a:r>
-            <a:r>
-              <a:rPr lang="it-IT" dirty="0"/>
-              <a:t>with a time </a:t>
+              <a:t> with LNBS solver with a time </a:t>
             </a:r>
             <a:r>
               <a:rPr lang="it-IT" dirty="0" err="1"/>
@@ -8699,11 +10870,19 @@
             </a:r>
             <a:r>
               <a:rPr lang="it-IT" dirty="0"/>
-              <a:t> </a:t>
-            </a:r>
-            <a:r>
-              <a:rPr lang="it-IT" dirty="0" err="1"/>
-              <a:t>has</a:t>
+              <a:t> and the </a:t>
+            </a:r>
+            <a:r>
+              <a:rPr lang="it-IT" dirty="0" err="1"/>
+              <a:t>primal</a:t>
+            </a:r>
+            <a:r>
+              <a:rPr lang="it-IT" dirty="0"/>
+              <a:t> gap </a:t>
+            </a:r>
+            <a:r>
+              <a:rPr lang="it-IT" dirty="0" err="1"/>
+              <a:t>have</a:t>
             </a:r>
             <a:r>
               <a:rPr lang="it-IT" dirty="0"/>
@@ -8917,7 +11096,7 @@
           <a:p>
             <a:r>
               <a:rPr lang="en-US" dirty="0"/>
-              <a:t>CR1 &amp; CR2: mixture of clustered and random data</a:t>
+              <a:t>RC1 &amp; RC2: mixture of clustered and random data</a:t>
             </a:r>
           </a:p>
           <a:p>
@@ -8926,7 +11105,7 @@
             </a:pPr>
             <a:r>
               <a:rPr lang="en-US" dirty="0"/>
-              <a:t>The coordinates are the same within sets of problems of one type (C, R, RC), but C1, R1 and RC1 have a shorter scheduling horizon, allowing only a few customers for route.</a:t>
+              <a:t>The coordinates are the same within sets of problems of one type (C, R, RC), but C1, R1 and RC1 have a shorter scheduling horizon and a lower vehicles capacity, allowing only a few customers for route.</a:t>
             </a:r>
           </a:p>
         </p:txBody>
@@ -8935,6 +11114,580 @@
     <p:extLst>
       <p:ext uri="{BB962C8B-B14F-4D97-AF65-F5344CB8AC3E}">
         <p14:creationId xmlns:p14="http://schemas.microsoft.com/office/powerpoint/2010/main" val="3954846787"/>
+      </p:ext>
+    </p:extLst>
+  </p:cSld>
+  <p:clrMapOvr>
+    <a:masterClrMapping/>
+  </p:clrMapOvr>
+</p:sld>
+</file>
+
+<file path=ppt/slides/slide7.xml><?xml version="1.0" encoding="utf-8"?>
+<p:sld xmlns:a="http://schemas.openxmlformats.org/drawingml/2006/main" xmlns:r="http://schemas.openxmlformats.org/officeDocument/2006/relationships" xmlns:p="http://schemas.openxmlformats.org/presentationml/2006/main">
+  <p:cSld>
+    <p:spTree>
+      <p:nvGrpSpPr>
+        <p:cNvPr id="1" name=""/>
+        <p:cNvGrpSpPr/>
+        <p:nvPr/>
+      </p:nvGrpSpPr>
+      <p:grpSpPr>
+        <a:xfrm>
+          <a:off x="0" y="0"/>
+          <a:ext cx="0" cy="0"/>
+          <a:chOff x="0" y="0"/>
+          <a:chExt cx="0" cy="0"/>
+        </a:xfrm>
+      </p:grpSpPr>
+      <p:sp>
+        <p:nvSpPr>
+          <p:cNvPr id="2" name="Titolo 1">
+            <a:extLst>
+              <a:ext uri="{FF2B5EF4-FFF2-40B4-BE49-F238E27FC236}">
+                <a16:creationId xmlns:a16="http://schemas.microsoft.com/office/drawing/2014/main" id="{41BB110A-F5CD-1071-6FCA-3E1DA9CB6447}"/>
+              </a:ext>
+            </a:extLst>
+          </p:cNvPr>
+          <p:cNvSpPr>
+            <a:spLocks noGrp="1"/>
+          </p:cNvSpPr>
+          <p:nvPr>
+            <p:ph type="title"/>
+          </p:nvPr>
+        </p:nvSpPr>
+        <p:spPr>
+          <a:xfrm>
+            <a:off x="838200" y="365126"/>
+            <a:ext cx="10515600" cy="734332"/>
+          </a:xfrm>
+        </p:spPr>
+        <p:txBody>
+          <a:bodyPr/>
+          <a:lstStyle/>
+          <a:p>
+            <a:pPr algn="ctr"/>
+            <a:r>
+              <a:rPr lang="it-IT" dirty="0" err="1"/>
+              <a:t>Results</a:t>
+            </a:r>
+            <a:r>
+              <a:rPr lang="it-IT" dirty="0"/>
+              <a:t> on the 1-Group </a:t>
+            </a:r>
+            <a:r>
+              <a:rPr lang="it-IT" dirty="0" err="1"/>
+              <a:t>instances</a:t>
+            </a:r>
+            <a:endParaRPr lang="it-IT" dirty="0"/>
+          </a:p>
+        </p:txBody>
+      </p:sp>
+      <p:pic>
+        <p:nvPicPr>
+          <p:cNvPr id="10" name="Segnaposto contenuto 9" descr="Immagine che contiene testo, Diagramma, linea, diagramma&#10;&#10;Il contenuto generato dall'IA potrebbe non essere corretto.">
+            <a:extLst>
+              <a:ext uri="{FF2B5EF4-FFF2-40B4-BE49-F238E27FC236}">
+                <a16:creationId xmlns:a16="http://schemas.microsoft.com/office/drawing/2014/main" id="{E547955F-4703-AFA7-7187-3ECDAD401B29}"/>
+              </a:ext>
+            </a:extLst>
+          </p:cNvPr>
+          <p:cNvPicPr>
+            <a:picLocks noGrp="1" noChangeAspect="1"/>
+          </p:cNvPicPr>
+          <p:nvPr>
+            <p:ph sz="half" idx="2"/>
+          </p:nvPr>
+        </p:nvPicPr>
+        <p:blipFill>
+          <a:blip r:embed="rId2">
+            <a:extLst>
+              <a:ext uri="{28A0092B-C50C-407E-A947-70E740481C1C}">
+                <a14:useLocalDpi xmlns:a14="http://schemas.microsoft.com/office/drawing/2010/main" val="0"/>
+              </a:ext>
+            </a:extLst>
+          </a:blip>
+          <a:stretch>
+            <a:fillRect/>
+          </a:stretch>
+        </p:blipFill>
+        <p:spPr>
+          <a:xfrm>
+            <a:off x="1404257" y="1099458"/>
+            <a:ext cx="9622470" cy="5393416"/>
+          </a:xfrm>
+        </p:spPr>
+      </p:pic>
+    </p:spTree>
+    <p:extLst>
+      <p:ext uri="{BB962C8B-B14F-4D97-AF65-F5344CB8AC3E}">
+        <p14:creationId xmlns:p14="http://schemas.microsoft.com/office/powerpoint/2010/main" val="2319321172"/>
+      </p:ext>
+    </p:extLst>
+  </p:cSld>
+  <p:clrMapOvr>
+    <a:masterClrMapping/>
+  </p:clrMapOvr>
+</p:sld>
+</file>
+
+<file path=ppt/slides/slide8.xml><?xml version="1.0" encoding="utf-8"?>
+<p:sld xmlns:a="http://schemas.openxmlformats.org/drawingml/2006/main" xmlns:r="http://schemas.openxmlformats.org/officeDocument/2006/relationships" xmlns:p="http://schemas.openxmlformats.org/presentationml/2006/main">
+  <p:cSld>
+    <p:spTree>
+      <p:nvGrpSpPr>
+        <p:cNvPr id="1" name="">
+          <a:extLst>
+            <a:ext uri="{FF2B5EF4-FFF2-40B4-BE49-F238E27FC236}">
+              <a16:creationId xmlns:a16="http://schemas.microsoft.com/office/drawing/2014/main" id="{F196BFC9-0187-1E29-9228-4BB8D78729C7}"/>
+            </a:ext>
+          </a:extLst>
+        </p:cNvPr>
+        <p:cNvGrpSpPr/>
+        <p:nvPr/>
+      </p:nvGrpSpPr>
+      <p:grpSpPr>
+        <a:xfrm>
+          <a:off x="0" y="0"/>
+          <a:ext cx="0" cy="0"/>
+          <a:chOff x="0" y="0"/>
+          <a:chExt cx="0" cy="0"/>
+        </a:xfrm>
+      </p:grpSpPr>
+      <p:sp>
+        <p:nvSpPr>
+          <p:cNvPr id="2" name="Titolo 1">
+            <a:extLst>
+              <a:ext uri="{FF2B5EF4-FFF2-40B4-BE49-F238E27FC236}">
+                <a16:creationId xmlns:a16="http://schemas.microsoft.com/office/drawing/2014/main" id="{BAAD9AA5-C38F-F932-6C51-477441AAE736}"/>
+              </a:ext>
+            </a:extLst>
+          </p:cNvPr>
+          <p:cNvSpPr>
+            <a:spLocks noGrp="1"/>
+          </p:cNvSpPr>
+          <p:nvPr>
+            <p:ph type="title"/>
+          </p:nvPr>
+        </p:nvSpPr>
+        <p:spPr>
+          <a:xfrm>
+            <a:off x="838200" y="365126"/>
+            <a:ext cx="10515600" cy="734332"/>
+          </a:xfrm>
+        </p:spPr>
+        <p:txBody>
+          <a:bodyPr/>
+          <a:lstStyle/>
+          <a:p>
+            <a:pPr algn="ctr"/>
+            <a:r>
+              <a:rPr lang="it-IT" dirty="0" err="1"/>
+              <a:t>Results</a:t>
+            </a:r>
+            <a:r>
+              <a:rPr lang="it-IT" dirty="0"/>
+              <a:t> on the 1-Group </a:t>
+            </a:r>
+            <a:r>
+              <a:rPr lang="it-IT" dirty="0" err="1"/>
+              <a:t>instances</a:t>
+            </a:r>
+            <a:endParaRPr lang="it-IT" dirty="0"/>
+          </a:p>
+        </p:txBody>
+      </p:sp>
+      <p:sp>
+        <p:nvSpPr>
+          <p:cNvPr id="4" name="Segnaposto contenuto 3">
+            <a:extLst>
+              <a:ext uri="{FF2B5EF4-FFF2-40B4-BE49-F238E27FC236}">
+                <a16:creationId xmlns:a16="http://schemas.microsoft.com/office/drawing/2014/main" id="{7DDCCA24-8F32-167A-BDC3-E0E416A7E5A3}"/>
+              </a:ext>
+            </a:extLst>
+          </p:cNvPr>
+          <p:cNvSpPr>
+            <a:spLocks noGrp="1"/>
+          </p:cNvSpPr>
+          <p:nvPr>
+            <p:ph sz="half" idx="2"/>
+          </p:nvPr>
+        </p:nvSpPr>
+        <p:spPr>
+          <a:xfrm>
+            <a:off x="751114" y="1447800"/>
+            <a:ext cx="10515600" cy="4729163"/>
+          </a:xfrm>
+        </p:spPr>
+        <p:txBody>
+          <a:bodyPr/>
+          <a:lstStyle/>
+          <a:p>
+            <a:r>
+              <a:rPr lang="it-IT" dirty="0"/>
+              <a:t>The CP model </a:t>
+            </a:r>
+            <a:r>
+              <a:rPr lang="it-IT" dirty="0" err="1"/>
+              <a:t>outperforms</a:t>
+            </a:r>
+            <a:r>
+              <a:rPr lang="it-IT" dirty="0"/>
+              <a:t> the DIDP models.</a:t>
+            </a:r>
+          </a:p>
+          <a:p>
+            <a:r>
+              <a:rPr lang="it-IT" dirty="0"/>
+              <a:t>In 1-Group, </a:t>
+            </a:r>
+            <a:r>
+              <a:rPr lang="it-IT" dirty="0" err="1"/>
+              <a:t>we</a:t>
+            </a:r>
+            <a:r>
+              <a:rPr lang="it-IT" dirty="0"/>
+              <a:t> </a:t>
+            </a:r>
+            <a:r>
+              <a:rPr lang="it-IT" dirty="0" err="1"/>
+              <a:t>have</a:t>
+            </a:r>
+            <a:r>
+              <a:rPr lang="it-IT" dirty="0"/>
+              <a:t> </a:t>
+            </a:r>
+            <a:r>
+              <a:rPr lang="it-IT" dirty="0" err="1"/>
+              <a:t>stricter</a:t>
+            </a:r>
+            <a:r>
+              <a:rPr lang="it-IT" dirty="0"/>
+              <a:t> </a:t>
+            </a:r>
+            <a:r>
+              <a:rPr lang="it-IT" dirty="0" err="1"/>
+              <a:t>constraints</a:t>
+            </a:r>
+            <a:r>
+              <a:rPr lang="it-IT" dirty="0"/>
+              <a:t> on time windows and </a:t>
+            </a:r>
+            <a:r>
+              <a:rPr lang="it-IT" dirty="0" err="1"/>
+              <a:t>capacity</a:t>
+            </a:r>
+            <a:r>
+              <a:rPr lang="it-IT" dirty="0"/>
+              <a:t>, </a:t>
+            </a:r>
+            <a:r>
+              <a:rPr lang="it-IT" dirty="0" err="1"/>
+              <a:t>allowing</a:t>
+            </a:r>
+            <a:r>
+              <a:rPr lang="it-IT" dirty="0"/>
+              <a:t> </a:t>
+            </a:r>
+            <a:r>
+              <a:rPr lang="it-IT" dirty="0" err="1"/>
+              <a:t>fewer</a:t>
+            </a:r>
+            <a:r>
+              <a:rPr lang="it-IT" dirty="0"/>
+              <a:t> </a:t>
+            </a:r>
+            <a:r>
+              <a:rPr lang="it-IT" dirty="0" err="1"/>
+              <a:t>transitions</a:t>
+            </a:r>
+            <a:r>
+              <a:rPr lang="it-IT" dirty="0"/>
+              <a:t> in </a:t>
+            </a:r>
+            <a:r>
+              <a:rPr lang="it-IT" dirty="0" err="1"/>
+              <a:t>each</a:t>
+            </a:r>
+            <a:r>
+              <a:rPr lang="it-IT" dirty="0"/>
+              <a:t> state.</a:t>
+            </a:r>
+          </a:p>
+          <a:p>
+            <a:r>
+              <a:rPr lang="it-IT" dirty="0"/>
+              <a:t>With a </a:t>
+            </a:r>
+            <a:r>
+              <a:rPr lang="it-IT" dirty="0" err="1"/>
+              <a:t>lower</a:t>
+            </a:r>
+            <a:r>
+              <a:rPr lang="it-IT" dirty="0"/>
+              <a:t> branching </a:t>
+            </a:r>
+            <a:r>
+              <a:rPr lang="it-IT" dirty="0" err="1"/>
+              <a:t>factor</a:t>
+            </a:r>
+            <a:r>
+              <a:rPr lang="it-IT" dirty="0"/>
+              <a:t>, the dual bounds </a:t>
+            </a:r>
+            <a:r>
+              <a:rPr lang="it-IT" dirty="0" err="1"/>
+              <a:t>seem</a:t>
+            </a:r>
+            <a:r>
+              <a:rPr lang="it-IT" dirty="0"/>
+              <a:t> to be good for </a:t>
+            </a:r>
+            <a:r>
+              <a:rPr lang="it-IT" dirty="0" err="1"/>
+              <a:t>search</a:t>
+            </a:r>
+            <a:r>
+              <a:rPr lang="it-IT" dirty="0"/>
+              <a:t> </a:t>
+            </a:r>
+            <a:r>
+              <a:rPr lang="it-IT" dirty="0" err="1"/>
+              <a:t>guidance</a:t>
+            </a:r>
+            <a:r>
+              <a:rPr lang="it-IT" dirty="0"/>
+              <a:t>, making the Complete model the best </a:t>
+            </a:r>
+            <a:r>
+              <a:rPr lang="it-IT" dirty="0" err="1"/>
+              <a:t>among</a:t>
+            </a:r>
+            <a:r>
+              <a:rPr lang="it-IT" dirty="0"/>
+              <a:t> the DIDP </a:t>
+            </a:r>
+            <a:r>
+              <a:rPr lang="it-IT" dirty="0" err="1"/>
+              <a:t>variations</a:t>
+            </a:r>
+            <a:r>
+              <a:rPr lang="it-IT" dirty="0"/>
+              <a:t>.</a:t>
+            </a:r>
+          </a:p>
+          <a:p>
+            <a:r>
+              <a:rPr lang="it-IT" dirty="0"/>
+              <a:t>The </a:t>
+            </a:r>
+            <a:r>
+              <a:rPr lang="it-IT" dirty="0" err="1"/>
+              <a:t>worst</a:t>
+            </a:r>
+            <a:r>
+              <a:rPr lang="it-IT" dirty="0"/>
+              <a:t> DIDP models are the </a:t>
+            </a:r>
+            <a:r>
+              <a:rPr lang="it-IT" dirty="0" err="1"/>
+              <a:t>ones</a:t>
+            </a:r>
+            <a:r>
+              <a:rPr lang="it-IT" dirty="0"/>
+              <a:t> </a:t>
+            </a:r>
+            <a:r>
+              <a:rPr lang="it-IT" dirty="0" err="1"/>
+              <a:t>without</a:t>
+            </a:r>
+            <a:r>
+              <a:rPr lang="it-IT" dirty="0"/>
+              <a:t> </a:t>
+            </a:r>
+            <a:r>
+              <a:rPr lang="it-IT" dirty="0" err="1"/>
+              <a:t>resource</a:t>
+            </a:r>
+            <a:r>
+              <a:rPr lang="it-IT" dirty="0"/>
+              <a:t> </a:t>
+            </a:r>
+            <a:r>
+              <a:rPr lang="it-IT" dirty="0" err="1"/>
+              <a:t>variables</a:t>
+            </a:r>
+            <a:r>
+              <a:rPr lang="it-IT" dirty="0"/>
+              <a:t>.</a:t>
+            </a:r>
+          </a:p>
+          <a:p>
+            <a:r>
+              <a:rPr lang="it-IT" dirty="0"/>
+              <a:t>The </a:t>
+            </a:r>
+            <a:r>
+              <a:rPr lang="it-IT" dirty="0" err="1"/>
+              <a:t>difference</a:t>
+            </a:r>
+            <a:r>
+              <a:rPr lang="it-IT" dirty="0"/>
+              <a:t> in performances </a:t>
+            </a:r>
+            <a:r>
+              <a:rPr lang="it-IT" dirty="0" err="1"/>
+              <a:t>between</a:t>
+            </a:r>
+            <a:r>
+              <a:rPr lang="it-IT" dirty="0"/>
+              <a:t> DIDP models </a:t>
+            </a:r>
+            <a:r>
+              <a:rPr lang="it-IT" dirty="0" err="1"/>
+              <a:t>is</a:t>
+            </a:r>
+            <a:r>
+              <a:rPr lang="it-IT" dirty="0"/>
+              <a:t> </a:t>
+            </a:r>
+            <a:r>
+              <a:rPr lang="it-IT" dirty="0" err="1"/>
+              <a:t>not</a:t>
+            </a:r>
+            <a:r>
+              <a:rPr lang="it-IT" dirty="0"/>
+              <a:t> so high, </a:t>
+            </a:r>
+            <a:r>
+              <a:rPr lang="it-IT" dirty="0" err="1"/>
+              <a:t>compared</a:t>
+            </a:r>
+            <a:r>
+              <a:rPr lang="it-IT" dirty="0"/>
+              <a:t> to CP vs DIDP.</a:t>
+            </a:r>
+          </a:p>
+        </p:txBody>
+      </p:sp>
+    </p:spTree>
+    <p:extLst>
+      <p:ext uri="{BB962C8B-B14F-4D97-AF65-F5344CB8AC3E}">
+        <p14:creationId xmlns:p14="http://schemas.microsoft.com/office/powerpoint/2010/main" val="3870173674"/>
+      </p:ext>
+    </p:extLst>
+  </p:cSld>
+  <p:clrMapOvr>
+    <a:masterClrMapping/>
+  </p:clrMapOvr>
+</p:sld>
+</file>
+
+<file path=ppt/slides/slide9.xml><?xml version="1.0" encoding="utf-8"?>
+<p:sld xmlns:a="http://schemas.openxmlformats.org/drawingml/2006/main" xmlns:r="http://schemas.openxmlformats.org/officeDocument/2006/relationships" xmlns:p="http://schemas.openxmlformats.org/presentationml/2006/main">
+  <p:cSld>
+    <p:spTree>
+      <p:nvGrpSpPr>
+        <p:cNvPr id="1" name="">
+          <a:extLst>
+            <a:ext uri="{FF2B5EF4-FFF2-40B4-BE49-F238E27FC236}">
+              <a16:creationId xmlns:a16="http://schemas.microsoft.com/office/drawing/2014/main" id="{3D0D7CA6-8B32-A15E-651D-10BD9FB08E0A}"/>
+            </a:ext>
+          </a:extLst>
+        </p:cNvPr>
+        <p:cNvGrpSpPr/>
+        <p:nvPr/>
+      </p:nvGrpSpPr>
+      <p:grpSpPr>
+        <a:xfrm>
+          <a:off x="0" y="0"/>
+          <a:ext cx="0" cy="0"/>
+          <a:chOff x="0" y="0"/>
+          <a:chExt cx="0" cy="0"/>
+        </a:xfrm>
+      </p:grpSpPr>
+      <p:sp>
+        <p:nvSpPr>
+          <p:cNvPr id="2" name="Titolo 1">
+            <a:extLst>
+              <a:ext uri="{FF2B5EF4-FFF2-40B4-BE49-F238E27FC236}">
+                <a16:creationId xmlns:a16="http://schemas.microsoft.com/office/drawing/2014/main" id="{62C1E75E-1CB0-F92D-E31C-3759E3B32512}"/>
+              </a:ext>
+            </a:extLst>
+          </p:cNvPr>
+          <p:cNvSpPr>
+            <a:spLocks noGrp="1"/>
+          </p:cNvSpPr>
+          <p:nvPr>
+            <p:ph type="title"/>
+          </p:nvPr>
+        </p:nvSpPr>
+        <p:spPr>
+          <a:xfrm>
+            <a:off x="838200" y="365126"/>
+            <a:ext cx="10515600" cy="734332"/>
+          </a:xfrm>
+        </p:spPr>
+        <p:txBody>
+          <a:bodyPr/>
+          <a:lstStyle/>
+          <a:p>
+            <a:pPr algn="ctr"/>
+            <a:r>
+              <a:rPr lang="it-IT" dirty="0" err="1"/>
+              <a:t>Results</a:t>
+            </a:r>
+            <a:r>
+              <a:rPr lang="it-IT" dirty="0"/>
+              <a:t> on the 2-Group </a:t>
+            </a:r>
+            <a:r>
+              <a:rPr lang="it-IT" dirty="0" err="1"/>
+              <a:t>instances</a:t>
+            </a:r>
+            <a:endParaRPr lang="it-IT" dirty="0"/>
+          </a:p>
+        </p:txBody>
+      </p:sp>
+      <p:pic>
+        <p:nvPicPr>
+          <p:cNvPr id="6" name="Segnaposto contenuto 5" descr="Immagine che contiene testo, Diagramma, linea, diagramma&#10;&#10;Il contenuto generato dall'IA potrebbe non essere corretto.">
+            <a:extLst>
+              <a:ext uri="{FF2B5EF4-FFF2-40B4-BE49-F238E27FC236}">
+                <a16:creationId xmlns:a16="http://schemas.microsoft.com/office/drawing/2014/main" id="{2047B36B-7AB6-5695-6019-BED968ED77AB}"/>
+              </a:ext>
+            </a:extLst>
+          </p:cNvPr>
+          <p:cNvPicPr>
+            <a:picLocks noGrp="1" noChangeAspect="1"/>
+          </p:cNvPicPr>
+          <p:nvPr>
+            <p:ph sz="half" idx="2"/>
+          </p:nvPr>
+        </p:nvPicPr>
+        <p:blipFill>
+          <a:blip r:embed="rId2">
+            <a:extLst>
+              <a:ext uri="{28A0092B-C50C-407E-A947-70E740481C1C}">
+                <a14:useLocalDpi xmlns:a14="http://schemas.microsoft.com/office/drawing/2010/main" val="0"/>
+              </a:ext>
+            </a:extLst>
+          </a:blip>
+          <a:stretch>
+            <a:fillRect/>
+          </a:stretch>
+        </p:blipFill>
+        <p:spPr>
+          <a:xfrm>
+            <a:off x="1587182" y="1031080"/>
+            <a:ext cx="9017635" cy="5461794"/>
+          </a:xfrm>
+        </p:spPr>
+      </p:pic>
+    </p:spTree>
+    <p:extLst>
+      <p:ext uri="{BB962C8B-B14F-4D97-AF65-F5344CB8AC3E}">
+        <p14:creationId xmlns:p14="http://schemas.microsoft.com/office/powerpoint/2010/main" val="343853169"/>
       </p:ext>
     </p:extLst>
   </p:cSld>

</xml_diff>